<commit_message>
edited the first presentation
</commit_message>
<xml_diff>
--- a/Presentations/JS_001.pptx
+++ b/Presentations/JS_001.pptx
@@ -255,7 +255,7 @@
       <p15:sldGuideLst xmlns:p15="http://schemas.microsoft.com/office/powerpoint/2012/main"/>
     </p:ext>
     <p:ext uri="http://customooxmlschemas.google.com/">
-      <go:slidesCustomData xmlns="" xmlns:mc="http://schemas.openxmlformats.org/markup-compatibility/2006" xmlns:mv="urn:schemas-microsoft-com:mac:vml" xmlns:c="http://schemas.openxmlformats.org/drawingml/2006/chart" xmlns:dgm="http://schemas.openxmlformats.org/drawingml/2006/diagram" xmlns:o="urn:schemas-microsoft-com:office:office" xmlns:v="urn:schemas-microsoft-com:vml" xmlns:pvml="urn:schemas-microsoft-com:office:powerpoint" xmlns:com="http://schemas.openxmlformats.org/drawingml/2006/compatibility" xmlns:p14="http://schemas.microsoft.com/office/powerpoint/2010/main" xmlns:p15="http://schemas.microsoft.com/office/powerpoint/2012/main" xmlns:go="http://customooxmlschemas.google.com/" r:id="rId13" roundtripDataSignature="AMtx7mhcB0blr/SQn/d9pBN/m19CWvRtWQ=="/>
+      <go:slidesCustomData xmlns:go="http://customooxmlschemas.google.com/" xmlns:p15="http://schemas.microsoft.com/office/powerpoint/2012/main" xmlns:p14="http://schemas.microsoft.com/office/powerpoint/2010/main" xmlns:com="http://schemas.openxmlformats.org/drawingml/2006/compatibility" xmlns:pvml="urn:schemas-microsoft-com:office:powerpoint" xmlns:v="urn:schemas-microsoft-com:vml" xmlns:o="urn:schemas-microsoft-com:office:office" xmlns:dgm="http://schemas.openxmlformats.org/drawingml/2006/diagram" xmlns:c="http://schemas.openxmlformats.org/drawingml/2006/chart" xmlns:mv="urn:schemas-microsoft-com:mac:vml" xmlns:mc="http://schemas.openxmlformats.org/markup-compatibility/2006" xmlns="" r:id="rId13" roundtripDataSignature="AMtx7mhcB0blr/SQn/d9pBN/m19CWvRtWQ=="/>
     </p:ext>
   </p:extLst>
 </p:presentation>
@@ -14948,7 +14948,7 @@
                 </a:solidFill>
                 <a:latin typeface="Consolas" panose="020B0609020204030204" pitchFamily="49" charset="0"/>
               </a:rPr>
-              <a:t> install -g @UI5/cli</a:t>
+              <a:t> install -g @ui5/cli</a:t>
             </a:r>
           </a:p>
           <a:p>
@@ -14959,7 +14959,7 @@
                 </a:solidFill>
                 <a:latin typeface="Consolas" panose="020B0609020204030204" pitchFamily="49" charset="0"/>
               </a:rPr>
-              <a:t>&gt; Ui5 --help</a:t>
+              <a:t>&gt; ui5 --help</a:t>
             </a:r>
           </a:p>
           <a:p>

</xml_diff>

<commit_message>
the 3rd sample added. order of the samples changed.
</commit_message>
<xml_diff>
--- a/Presentations/JS_001.pptx
+++ b/Presentations/JS_001.pptx
@@ -5,7 +5,7 @@
     <p:sldMasterId id="2147483648" r:id="rId1"/>
   </p:sldMasterIdLst>
   <p:notesMasterIdLst>
-    <p:notesMasterId r:id="rId12"/>
+    <p:notesMasterId r:id="rId15"/>
   </p:notesMasterIdLst>
   <p:sldIdLst>
     <p:sldId id="256" r:id="rId2"/>
@@ -18,6 +18,9 @@
     <p:sldId id="263" r:id="rId9"/>
     <p:sldId id="264" r:id="rId10"/>
     <p:sldId id="265" r:id="rId11"/>
+    <p:sldId id="268" r:id="rId12"/>
+    <p:sldId id="266" r:id="rId13"/>
+    <p:sldId id="267" r:id="rId14"/>
   </p:sldIdLst>
   <p:sldSz cx="12192000" cy="6858000"/>
   <p:notesSz cx="6858000" cy="9144000"/>
@@ -255,7 +258,7 @@
       <p15:sldGuideLst xmlns:p15="http://schemas.microsoft.com/office/powerpoint/2012/main"/>
     </p:ext>
     <p:ext uri="http://customooxmlschemas.google.com/">
-      <go:slidesCustomData xmlns:go="http://customooxmlschemas.google.com/" xmlns:p15="http://schemas.microsoft.com/office/powerpoint/2012/main" xmlns:p14="http://schemas.microsoft.com/office/powerpoint/2010/main" xmlns:com="http://schemas.openxmlformats.org/drawingml/2006/compatibility" xmlns:pvml="urn:schemas-microsoft-com:office:powerpoint" xmlns:v="urn:schemas-microsoft-com:vml" xmlns:o="urn:schemas-microsoft-com:office:office" xmlns:dgm="http://schemas.openxmlformats.org/drawingml/2006/diagram" xmlns:c="http://schemas.openxmlformats.org/drawingml/2006/chart" xmlns:mv="urn:schemas-microsoft-com:mac:vml" xmlns:mc="http://schemas.openxmlformats.org/markup-compatibility/2006" xmlns="" r:id="rId13" roundtripDataSignature="AMtx7mhcB0blr/SQn/d9pBN/m19CWvRtWQ=="/>
+      <go:slidesCustomData xmlns:go="http://customooxmlschemas.google.com/" xmlns:p15="http://schemas.microsoft.com/office/powerpoint/2012/main" xmlns:p14="http://schemas.microsoft.com/office/powerpoint/2010/main" xmlns:com="http://schemas.openxmlformats.org/drawingml/2006/compatibility" xmlns:pvml="urn:schemas-microsoft-com:office:powerpoint" xmlns:v="urn:schemas-microsoft-com:vml" xmlns:o="urn:schemas-microsoft-com:office:office" xmlns:dgm="http://schemas.openxmlformats.org/drawingml/2006/diagram" xmlns:c="http://schemas.openxmlformats.org/drawingml/2006/chart" xmlns:mv="urn:schemas-microsoft-com:mac:vml" xmlns:mc="http://schemas.openxmlformats.org/markup-compatibility/2006" xmlns="" r:id="rId16" roundtripDataSignature="AMtx7mhcB0blr/SQn/d9pBN/m19CWvRtWQ=="/>
     </p:ext>
   </p:extLst>
 </p:presentation>
@@ -1313,6 +1316,293 @@
 </p:notes>
 </file>
 
+<file path=ppt/notesSlides/notesSlide7.xml><?xml version="1.0" encoding="utf-8"?>
+<p:notes xmlns:a="http://schemas.openxmlformats.org/drawingml/2006/main" xmlns:r="http://schemas.openxmlformats.org/officeDocument/2006/relationships" xmlns:p="http://schemas.openxmlformats.org/presentationml/2006/main">
+  <p:cSld>
+    <p:spTree>
+      <p:nvGrpSpPr>
+        <p:cNvPr id="1" name=""/>
+        <p:cNvGrpSpPr/>
+        <p:nvPr/>
+      </p:nvGrpSpPr>
+      <p:grpSpPr>
+        <a:xfrm>
+          <a:off x="0" y="0"/>
+          <a:ext cx="0" cy="0"/>
+          <a:chOff x="0" y="0"/>
+          <a:chExt cx="0" cy="0"/>
+        </a:xfrm>
+      </p:grpSpPr>
+      <p:sp>
+        <p:nvSpPr>
+          <p:cNvPr id="2" name="Slide Image Placeholder 1"/>
+          <p:cNvSpPr>
+            <a:spLocks noGrp="1" noRot="1" noChangeAspect="1"/>
+          </p:cNvSpPr>
+          <p:nvPr>
+            <p:ph type="sldImg"/>
+          </p:nvPr>
+        </p:nvSpPr>
+        <p:spPr>
+          <a:xfrm>
+            <a:off x="381000" y="685800"/>
+            <a:ext cx="6096000" cy="3429000"/>
+          </a:xfrm>
+        </p:spPr>
+      </p:sp>
+      <p:sp>
+        <p:nvSpPr>
+          <p:cNvPr id="3" name="Notes Placeholder 2"/>
+          <p:cNvSpPr>
+            <a:spLocks noGrp="1"/>
+          </p:cNvSpPr>
+          <p:nvPr>
+            <p:ph type="body" idx="1"/>
+          </p:nvPr>
+        </p:nvSpPr>
+        <p:spPr/>
+        <p:txBody>
+          <a:bodyPr/>
+          <a:lstStyle/>
+          <a:p>
+            <a:r>
+              <a:rPr lang="en-GB" sz="1100" b="0" i="0" u="none" strike="noStrike" cap="none" dirty="0">
+                <a:solidFill>
+                  <a:srgbClr val="000000"/>
+                </a:solidFill>
+                <a:effectLst/>
+                <a:latin typeface="Arial"/>
+                <a:ea typeface="Arial"/>
+                <a:cs typeface="Arial"/>
+                <a:sym typeface="Arial"/>
+              </a:rPr>
+              <a:t>The process of loading and initializing UI5 library is called bootstrapping.</a:t>
+            </a:r>
+          </a:p>
+          <a:p>
+            <a:r>
+              <a:rPr lang="en-GB" sz="1100" b="0" i="0" u="none" strike="noStrike" cap="none" dirty="0">
+                <a:solidFill>
+                  <a:srgbClr val="000000"/>
+                </a:solidFill>
+                <a:effectLst/>
+                <a:latin typeface="Arial"/>
+                <a:ea typeface="Arial"/>
+                <a:cs typeface="Arial"/>
+                <a:sym typeface="Arial"/>
+              </a:rPr>
+              <a:t>The </a:t>
+            </a:r>
+            <a:r>
+              <a:rPr lang="en-GB" sz="1100" b="0" i="0" u="none" strike="noStrike" cap="none" dirty="0" err="1">
+                <a:solidFill>
+                  <a:srgbClr val="000000"/>
+                </a:solidFill>
+                <a:effectLst/>
+                <a:latin typeface="Arial"/>
+                <a:ea typeface="Arial"/>
+                <a:cs typeface="Arial"/>
+                <a:sym typeface="Arial"/>
+              </a:rPr>
+              <a:t>src</a:t>
+            </a:r>
+            <a:r>
+              <a:rPr lang="en-GB" sz="1100" b="0" i="0" u="none" strike="noStrike" cap="none" dirty="0">
+                <a:solidFill>
+                  <a:srgbClr val="000000"/>
+                </a:solidFill>
+                <a:effectLst/>
+                <a:latin typeface="Arial"/>
+                <a:ea typeface="Arial"/>
+                <a:cs typeface="Arial"/>
+                <a:sym typeface="Arial"/>
+              </a:rPr>
+              <a:t> attribute of the &lt;script&gt; tag tells the browser where to find the OpenUI5 core library – it initializes the OpenUI5 runtime and loads additional resources, such as the libraries specified in the data-sap-</a:t>
+            </a:r>
+            <a:r>
+              <a:rPr lang="en-GB" sz="1100" b="0" i="0" u="none" strike="noStrike" cap="none" dirty="0" err="1">
+                <a:solidFill>
+                  <a:srgbClr val="000000"/>
+                </a:solidFill>
+                <a:effectLst/>
+                <a:latin typeface="Arial"/>
+                <a:ea typeface="Arial"/>
+                <a:cs typeface="Arial"/>
+                <a:sym typeface="Arial"/>
+              </a:rPr>
+              <a:t>ui</a:t>
+            </a:r>
+            <a:r>
+              <a:rPr lang="en-GB" sz="1100" b="0" i="0" u="none" strike="noStrike" cap="none" dirty="0">
+                <a:solidFill>
+                  <a:srgbClr val="000000"/>
+                </a:solidFill>
+                <a:effectLst/>
+                <a:latin typeface="Arial"/>
+                <a:ea typeface="Arial"/>
+                <a:cs typeface="Arial"/>
+                <a:sym typeface="Arial"/>
+              </a:rPr>
+              <a:t>-libs attribute.</a:t>
+            </a:r>
+          </a:p>
+          <a:p>
+            <a:r>
+              <a:rPr lang="en-GB" sz="1100" b="0" i="0" u="none" strike="noStrike" cap="none" dirty="0">
+                <a:solidFill>
+                  <a:srgbClr val="000000"/>
+                </a:solidFill>
+                <a:effectLst/>
+                <a:latin typeface="Arial"/>
+                <a:ea typeface="Arial"/>
+                <a:cs typeface="Arial"/>
+                <a:sym typeface="Arial"/>
+              </a:rPr>
+              <a:t>The OpenUI5 controls support different themes, we choose </a:t>
+            </a:r>
+            <a:r>
+              <a:rPr lang="en-GB" sz="1100" b="0" i="0" u="none" strike="noStrike" cap="none" dirty="0" err="1">
+                <a:solidFill>
+                  <a:srgbClr val="000000"/>
+                </a:solidFill>
+                <a:effectLst/>
+                <a:latin typeface="Arial"/>
+                <a:ea typeface="Arial"/>
+                <a:cs typeface="Arial"/>
+                <a:sym typeface="Arial"/>
+              </a:rPr>
+              <a:t>sap_belize</a:t>
+            </a:r>
+            <a:r>
+              <a:rPr lang="en-GB" sz="1100" b="0" i="0" u="none" strike="noStrike" cap="none" dirty="0">
+                <a:solidFill>
+                  <a:srgbClr val="000000"/>
+                </a:solidFill>
+                <a:effectLst/>
+                <a:latin typeface="Arial"/>
+                <a:ea typeface="Arial"/>
+                <a:cs typeface="Arial"/>
+                <a:sym typeface="Arial"/>
+              </a:rPr>
+              <a:t> as our default theme.</a:t>
+            </a:r>
+          </a:p>
+          <a:p>
+            <a:r>
+              <a:rPr lang="en-GB" sz="1100" b="0" i="0" u="none" strike="noStrike" cap="none" dirty="0">
+                <a:solidFill>
+                  <a:srgbClr val="000000"/>
+                </a:solidFill>
+                <a:effectLst/>
+                <a:latin typeface="Arial"/>
+                <a:ea typeface="Arial"/>
+                <a:cs typeface="Arial"/>
+                <a:sym typeface="Arial"/>
+              </a:rPr>
+              <a:t>We specify the required UI library </a:t>
+            </a:r>
+            <a:r>
+              <a:rPr lang="en-GB" sz="1100" b="0" i="0" u="none" strike="noStrike" cap="none" dirty="0" err="1">
+                <a:solidFill>
+                  <a:srgbClr val="000000"/>
+                </a:solidFill>
+                <a:effectLst/>
+                <a:latin typeface="Arial"/>
+                <a:ea typeface="Arial"/>
+                <a:cs typeface="Arial"/>
+                <a:sym typeface="Arial"/>
+              </a:rPr>
+              <a:t>sap.m</a:t>
+            </a:r>
+            <a:r>
+              <a:rPr lang="en-GB" sz="1100" b="0" i="0" u="none" strike="noStrike" cap="none" dirty="0">
+                <a:solidFill>
+                  <a:srgbClr val="000000"/>
+                </a:solidFill>
+                <a:effectLst/>
+                <a:latin typeface="Arial"/>
+                <a:ea typeface="Arial"/>
+                <a:cs typeface="Arial"/>
+                <a:sym typeface="Arial"/>
+              </a:rPr>
+              <a:t> containing the UI controls we need for this tutorial.</a:t>
+            </a:r>
+          </a:p>
+          <a:p>
+            <a:r>
+              <a:rPr lang="en-GB" sz="1100" b="0" i="0" u="none" strike="noStrike" cap="none" dirty="0">
+                <a:solidFill>
+                  <a:srgbClr val="000000"/>
+                </a:solidFill>
+                <a:effectLst/>
+                <a:latin typeface="Arial"/>
+                <a:ea typeface="Arial"/>
+                <a:cs typeface="Arial"/>
+                <a:sym typeface="Arial"/>
+              </a:rPr>
+              <a:t>To make use of the most recent functionality of OpenUI5 we define the compatibility version as edge.</a:t>
+            </a:r>
+          </a:p>
+          <a:p>
+            <a:r>
+              <a:rPr lang="en-GB" sz="1100" b="0" i="0" u="none" strike="noStrike" cap="none" dirty="0">
+                <a:solidFill>
+                  <a:srgbClr val="000000"/>
+                </a:solidFill>
+                <a:effectLst/>
+                <a:latin typeface="Arial"/>
+                <a:ea typeface="Arial"/>
+                <a:cs typeface="Arial"/>
+                <a:sym typeface="Arial"/>
+              </a:rPr>
+              <a:t>We configure the process of “bootstrapping” to run asynchronously.</a:t>
+            </a:r>
+          </a:p>
+          <a:p>
+            <a:r>
+              <a:rPr lang="en-GB" sz="1100" b="0" i="0" u="none" strike="noStrike" cap="none" dirty="0">
+                <a:solidFill>
+                  <a:srgbClr val="000000"/>
+                </a:solidFill>
+                <a:effectLst/>
+                <a:latin typeface="Arial"/>
+                <a:ea typeface="Arial"/>
+                <a:cs typeface="Arial"/>
+                <a:sym typeface="Arial"/>
+              </a:rPr>
+              <a:t>This means that the OpenUI5 resources can be loaded simultaneously in the background for performance reasons.</a:t>
+            </a:r>
+          </a:p>
+          <a:p>
+            <a:r>
+              <a:rPr lang="en-GB" sz="1100" b="0" i="0" u="none" strike="noStrike" cap="none" dirty="0">
+                <a:solidFill>
+                  <a:srgbClr val="000000"/>
+                </a:solidFill>
+                <a:effectLst/>
+                <a:latin typeface="Arial"/>
+                <a:ea typeface="Arial"/>
+                <a:cs typeface="Arial"/>
+                <a:sym typeface="Arial"/>
+              </a:rPr>
+              <a:t>We define the module to be loaded initially in a declarative way. With this, we avoid directly executable JavaScript code in the HTML file. This makes your app more secure. We will create the script that this references to further down in this step.</a:t>
+            </a:r>
+          </a:p>
+        </p:txBody>
+      </p:sp>
+    </p:spTree>
+    <p:extLst>
+      <p:ext uri="{BB962C8B-B14F-4D97-AF65-F5344CB8AC3E}">
+        <p14:creationId xmlns:p14="http://schemas.microsoft.com/office/powerpoint/2010/main" val="571785755"/>
+      </p:ext>
+    </p:extLst>
+  </p:cSld>
+  <p:clrMapOvr>
+    <a:masterClrMapping/>
+  </p:clrMapOvr>
+</p:notes>
+</file>
+
 <file path=ppt/slideLayouts/slideLayout1.xml><?xml version="1.0" encoding="utf-8"?>
 <p:sldLayout xmlns:a="http://schemas.openxmlformats.org/drawingml/2006/main" xmlns:r="http://schemas.openxmlformats.org/officeDocument/2006/relationships" xmlns:p="http://schemas.openxmlformats.org/presentationml/2006/main" matchingName="Titelfolie" type="title">
   <p:cSld name="TITLE">
@@ -11537,141 +11827,6 @@
     <p:sldLayoutId id="2147483658" r:id="rId10"/>
     <p:sldLayoutId id="2147483659" r:id="rId11"/>
   </p:sldLayoutIdLst>
-  <p:timing>
-    <p:tnLst>
-      <p:par>
-        <p:cTn id="1" dur="indefinite" restart="never" nodeType="tmRoot">
-          <p:childTnLst>
-            <p:seq concurrent="1" nextAc="seek">
-              <p:cTn id="2" dur="indefinite" nodeType="mainSeq">
-                <p:childTnLst>
-                  <p:par>
-                    <p:cTn id="3" fill="hold">
-                      <p:stCondLst>
-                        <p:cond delay="indefinite"/>
-                        <p:cond evt="onBegin" delay="0">
-                          <p:tn val="2"/>
-                        </p:cond>
-                      </p:stCondLst>
-                      <p:childTnLst>
-                        <p:par>
-                          <p:cTn id="4" fill="hold">
-                            <p:stCondLst>
-                              <p:cond delay="0"/>
-                            </p:stCondLst>
-                            <p:childTnLst>
-                              <p:par>
-                                <p:cTn id="5" presetID="32" presetClass="emph" presetSubtype="0" fill="hold" nodeType="withEffect">
-                                  <p:stCondLst>
-                                    <p:cond delay="3000"/>
-                                  </p:stCondLst>
-                                  <p:childTnLst>
-                                    <p:animRot by="120000">
-                                      <p:cBhvr>
-                                        <p:cTn id="6" dur="100" fill="hold">
-                                          <p:stCondLst>
-                                            <p:cond delay="0"/>
-                                          </p:stCondLst>
-                                        </p:cTn>
-                                        <p:tgtEl>
-                                          <p:spTgt spid="5"/>
-                                        </p:tgtEl>
-                                        <p:attrNameLst>
-                                          <p:attrName>r</p:attrName>
-                                        </p:attrNameLst>
-                                      </p:cBhvr>
-                                    </p:animRot>
-                                    <p:animRot by="-240000">
-                                      <p:cBhvr>
-                                        <p:cTn id="7" dur="200" fill="hold">
-                                          <p:stCondLst>
-                                            <p:cond delay="200"/>
-                                          </p:stCondLst>
-                                        </p:cTn>
-                                        <p:tgtEl>
-                                          <p:spTgt spid="5"/>
-                                        </p:tgtEl>
-                                        <p:attrNameLst>
-                                          <p:attrName>r</p:attrName>
-                                        </p:attrNameLst>
-                                      </p:cBhvr>
-                                    </p:animRot>
-                                    <p:animRot by="240000">
-                                      <p:cBhvr>
-                                        <p:cTn id="8" dur="200" fill="hold">
-                                          <p:stCondLst>
-                                            <p:cond delay="400"/>
-                                          </p:stCondLst>
-                                        </p:cTn>
-                                        <p:tgtEl>
-                                          <p:spTgt spid="5"/>
-                                        </p:tgtEl>
-                                        <p:attrNameLst>
-                                          <p:attrName>r</p:attrName>
-                                        </p:attrNameLst>
-                                      </p:cBhvr>
-                                    </p:animRot>
-                                    <p:animRot by="-240000">
-                                      <p:cBhvr>
-                                        <p:cTn id="9" dur="200" fill="hold">
-                                          <p:stCondLst>
-                                            <p:cond delay="600"/>
-                                          </p:stCondLst>
-                                        </p:cTn>
-                                        <p:tgtEl>
-                                          <p:spTgt spid="5"/>
-                                        </p:tgtEl>
-                                        <p:attrNameLst>
-                                          <p:attrName>r</p:attrName>
-                                        </p:attrNameLst>
-                                      </p:cBhvr>
-                                    </p:animRot>
-                                    <p:animRot by="120000">
-                                      <p:cBhvr>
-                                        <p:cTn id="10" dur="200" fill="hold">
-                                          <p:stCondLst>
-                                            <p:cond delay="800"/>
-                                          </p:stCondLst>
-                                        </p:cTn>
-                                        <p:tgtEl>
-                                          <p:spTgt spid="5"/>
-                                        </p:tgtEl>
-                                        <p:attrNameLst>
-                                          <p:attrName>r</p:attrName>
-                                        </p:attrNameLst>
-                                      </p:cBhvr>
-                                    </p:animRot>
-                                  </p:childTnLst>
-                                </p:cTn>
-                              </p:par>
-                            </p:childTnLst>
-                          </p:cTn>
-                        </p:par>
-                      </p:childTnLst>
-                    </p:cTn>
-                  </p:par>
-                </p:childTnLst>
-              </p:cTn>
-              <p:prevCondLst>
-                <p:cond evt="onPrev" delay="0">
-                  <p:tgtEl>
-                    <p:sldTgt/>
-                  </p:tgtEl>
-                </p:cond>
-              </p:prevCondLst>
-              <p:nextCondLst>
-                <p:cond evt="onNext" delay="0">
-                  <p:tgtEl>
-                    <p:sldTgt/>
-                  </p:tgtEl>
-                </p:cond>
-              </p:nextCondLst>
-            </p:seq>
-          </p:childTnLst>
-        </p:cTn>
-      </p:par>
-    </p:tnLst>
-  </p:timing>
   <p:hf sldNum="0" hdr="0" ftr="0" dt="0"/>
   <p:txStyles>
     <p:titleStyle>
@@ -12806,7 +12961,260 @@
           <a:p>
             <a:r>
               <a:rPr lang="en-US" dirty="0"/>
-              <a:t>App#1: Hello World!</a:t>
+              <a:t>App#0: Node.js and Sample App!</a:t>
+            </a:r>
+          </a:p>
+        </p:txBody>
+      </p:sp>
+      <p:pic>
+        <p:nvPicPr>
+          <p:cNvPr id="5" name="Picture 4" descr="A screenshot of a computer screen&#10;&#10;Description automatically generated">
+            <a:extLst>
+              <a:ext uri="{FF2B5EF4-FFF2-40B4-BE49-F238E27FC236}">
+                <a16:creationId xmlns:a16="http://schemas.microsoft.com/office/drawing/2014/main" id="{31982C35-8661-43F8-8FD0-D4E3BA57D477}"/>
+              </a:ext>
+            </a:extLst>
+          </p:cNvPr>
+          <p:cNvPicPr>
+            <a:picLocks noChangeAspect="1"/>
+          </p:cNvPicPr>
+          <p:nvPr/>
+        </p:nvPicPr>
+        <p:blipFill>
+          <a:blip r:embed="rId2"/>
+          <a:stretch>
+            <a:fillRect/>
+          </a:stretch>
+        </p:blipFill>
+        <p:spPr>
+          <a:xfrm>
+            <a:off x="2345352" y="3020678"/>
+            <a:ext cx="5494941" cy="3837322"/>
+          </a:xfrm>
+          <a:prstGeom prst="rect">
+            <a:avLst/>
+          </a:prstGeom>
+        </p:spPr>
+      </p:pic>
+      <p:sp>
+        <p:nvSpPr>
+          <p:cNvPr id="3" name="Rectangle 2">
+            <a:extLst>
+              <a:ext uri="{FF2B5EF4-FFF2-40B4-BE49-F238E27FC236}">
+                <a16:creationId xmlns:a16="http://schemas.microsoft.com/office/drawing/2014/main" id="{043F118F-7CB7-43B0-8F56-DBA4B6231B65}"/>
+              </a:ext>
+            </a:extLst>
+          </p:cNvPr>
+          <p:cNvSpPr/>
+          <p:nvPr/>
+        </p:nvSpPr>
+        <p:spPr>
+          <a:xfrm>
+            <a:off x="232755" y="1404851"/>
+            <a:ext cx="9720137" cy="1615827"/>
+          </a:xfrm>
+          <a:prstGeom prst="rect">
+            <a:avLst/>
+          </a:prstGeom>
+          <a:solidFill>
+            <a:schemeClr val="tx1">
+              <a:lumMod val="95000"/>
+              <a:lumOff val="5000"/>
+            </a:schemeClr>
+          </a:solidFill>
+        </p:spPr>
+        <p:txBody>
+          <a:bodyPr wrap="square">
+            <a:spAutoFit/>
+          </a:bodyPr>
+          <a:lstStyle/>
+          <a:p>
+            <a:r>
+              <a:rPr lang="en-GB" sz="1100" dirty="0">
+                <a:solidFill>
+                  <a:schemeClr val="bg1"/>
+                </a:solidFill>
+                <a:latin typeface="Consolas" panose="020B0609020204030204" pitchFamily="49" charset="0"/>
+              </a:rPr>
+              <a:t>&gt; </a:t>
+            </a:r>
+            <a:r>
+              <a:rPr lang="en-GB" sz="1100" dirty="0" err="1">
+                <a:solidFill>
+                  <a:schemeClr val="bg1"/>
+                </a:solidFill>
+                <a:latin typeface="Consolas" panose="020B0609020204030204" pitchFamily="49" charset="0"/>
+              </a:rPr>
+              <a:t>npm</a:t>
+            </a:r>
+            <a:r>
+              <a:rPr lang="en-GB" sz="1100" dirty="0">
+                <a:solidFill>
+                  <a:schemeClr val="bg1"/>
+                </a:solidFill>
+                <a:latin typeface="Consolas" panose="020B0609020204030204" pitchFamily="49" charset="0"/>
+              </a:rPr>
+              <a:t> install -g @ui5/cli</a:t>
+            </a:r>
+          </a:p>
+          <a:p>
+            <a:r>
+              <a:rPr lang="en-GB" sz="1100" dirty="0">
+                <a:solidFill>
+                  <a:schemeClr val="bg1"/>
+                </a:solidFill>
+                <a:latin typeface="Consolas" panose="020B0609020204030204" pitchFamily="49" charset="0"/>
+              </a:rPr>
+              <a:t>&gt; ui5 --help</a:t>
+            </a:r>
+          </a:p>
+          <a:p>
+            <a:r>
+              <a:rPr lang="en-GB" sz="1100" dirty="0">
+                <a:solidFill>
+                  <a:schemeClr val="bg1"/>
+                </a:solidFill>
+                <a:latin typeface="Consolas" panose="020B0609020204030204" pitchFamily="49" charset="0"/>
+              </a:rPr>
+              <a:t>&gt; git clone https://github.com/SAP/openui5-basic-template-app.git</a:t>
+            </a:r>
+          </a:p>
+          <a:p>
+            <a:r>
+              <a:rPr lang="en-GB" sz="1100" dirty="0">
+                <a:solidFill>
+                  <a:schemeClr val="bg1"/>
+                </a:solidFill>
+                <a:latin typeface="Consolas" panose="020B0609020204030204" pitchFamily="49" charset="0"/>
+              </a:rPr>
+              <a:t>&gt; cd openui5-basic-template-app</a:t>
+            </a:r>
+          </a:p>
+          <a:p>
+            <a:r>
+              <a:rPr lang="en-GB" sz="1100" dirty="0">
+                <a:solidFill>
+                  <a:schemeClr val="bg1"/>
+                </a:solidFill>
+                <a:latin typeface="Consolas" panose="020B0609020204030204" pitchFamily="49" charset="0"/>
+              </a:rPr>
+              <a:t>&gt; </a:t>
+            </a:r>
+            <a:r>
+              <a:rPr lang="en-GB" sz="1100" dirty="0" err="1">
+                <a:solidFill>
+                  <a:schemeClr val="bg1"/>
+                </a:solidFill>
+                <a:latin typeface="Consolas" panose="020B0609020204030204" pitchFamily="49" charset="0"/>
+              </a:rPr>
+              <a:t>npm</a:t>
+            </a:r>
+            <a:r>
+              <a:rPr lang="en-GB" sz="1100" dirty="0">
+                <a:solidFill>
+                  <a:schemeClr val="bg1"/>
+                </a:solidFill>
+                <a:latin typeface="Consolas" panose="020B0609020204030204" pitchFamily="49" charset="0"/>
+              </a:rPr>
+              <a:t> install </a:t>
+            </a:r>
+          </a:p>
+          <a:p>
+            <a:r>
+              <a:rPr lang="en-GB" sz="1100" dirty="0">
+                <a:solidFill>
+                  <a:schemeClr val="bg1"/>
+                </a:solidFill>
+                <a:latin typeface="Consolas" panose="020B0609020204030204" pitchFamily="49" charset="0"/>
+              </a:rPr>
+              <a:t>&gt; </a:t>
+            </a:r>
+            <a:r>
+              <a:rPr lang="en-GB" sz="1100" dirty="0" err="1">
+                <a:solidFill>
+                  <a:schemeClr val="bg1"/>
+                </a:solidFill>
+                <a:latin typeface="Consolas" panose="020B0609020204030204" pitchFamily="49" charset="0"/>
+              </a:rPr>
+              <a:t>npm</a:t>
+            </a:r>
+            <a:r>
+              <a:rPr lang="en-GB" sz="1100" dirty="0">
+                <a:solidFill>
+                  <a:schemeClr val="bg1"/>
+                </a:solidFill>
+                <a:latin typeface="Consolas" panose="020B0609020204030204" pitchFamily="49" charset="0"/>
+              </a:rPr>
+              <a:t> run</a:t>
+            </a:r>
+          </a:p>
+          <a:p>
+            <a:r>
+              <a:rPr lang="en-GB" sz="1100" dirty="0">
+                <a:solidFill>
+                  <a:schemeClr val="bg1"/>
+                </a:solidFill>
+                <a:latin typeface="Consolas" panose="020B0609020204030204" pitchFamily="49" charset="0"/>
+              </a:rPr>
+              <a:t>&gt; ui5 serve -o /index.html</a:t>
+            </a:r>
+          </a:p>
+          <a:p>
+            <a:r>
+              <a:rPr lang="en-GB" sz="1100" dirty="0">
+                <a:solidFill>
+                  <a:schemeClr val="bg1"/>
+                </a:solidFill>
+                <a:latin typeface="Consolas" panose="020B0609020204030204" pitchFamily="49" charset="0"/>
+              </a:rPr>
+              <a:t>&gt; </a:t>
+            </a:r>
+            <a:r>
+              <a:rPr lang="en-GB" sz="1100" dirty="0" err="1">
+                <a:solidFill>
+                  <a:schemeClr val="bg1"/>
+                </a:solidFill>
+                <a:latin typeface="Consolas" panose="020B0609020204030204" pitchFamily="49" charset="0"/>
+              </a:rPr>
+              <a:t>npm</a:t>
+            </a:r>
+            <a:r>
+              <a:rPr lang="en-GB" sz="1100" dirty="0">
+                <a:solidFill>
+                  <a:schemeClr val="bg1"/>
+                </a:solidFill>
+                <a:latin typeface="Consolas" panose="020B0609020204030204" pitchFamily="49" charset="0"/>
+              </a:rPr>
+              <a:t> run lint</a:t>
+            </a:r>
+          </a:p>
+          <a:p>
+            <a:r>
+              <a:rPr lang="en-GB" sz="1100" dirty="0">
+                <a:solidFill>
+                  <a:schemeClr val="bg1"/>
+                </a:solidFill>
+                <a:latin typeface="Consolas" panose="020B0609020204030204" pitchFamily="49" charset="0"/>
+              </a:rPr>
+              <a:t>&gt; </a:t>
+            </a:r>
+            <a:r>
+              <a:rPr lang="en-GB" sz="1100" dirty="0" err="1">
+                <a:solidFill>
+                  <a:schemeClr val="bg1"/>
+                </a:solidFill>
+                <a:latin typeface="Consolas" panose="020B0609020204030204" pitchFamily="49" charset="0"/>
+              </a:rPr>
+              <a:t>npm</a:t>
+            </a:r>
+            <a:r>
+              <a:rPr lang="en-GB" sz="1100" dirty="0">
+                <a:solidFill>
+                  <a:schemeClr val="bg1"/>
+                </a:solidFill>
+                <a:latin typeface="Consolas" panose="020B0609020204030204" pitchFamily="49" charset="0"/>
+              </a:rPr>
+              <a:t> test</a:t>
             </a:r>
           </a:p>
         </p:txBody>
@@ -12815,6 +13223,3402 @@
     <p:extLst>
       <p:ext uri="{BB962C8B-B14F-4D97-AF65-F5344CB8AC3E}">
         <p14:creationId xmlns:p14="http://schemas.microsoft.com/office/powerpoint/2010/main" val="2876736905"/>
+      </p:ext>
+    </p:extLst>
+  </p:cSld>
+  <p:clrMapOvr>
+    <a:masterClrMapping/>
+  </p:clrMapOvr>
+</p:sld>
+</file>
+
+<file path=ppt/slides/slide11.xml><?xml version="1.0" encoding="utf-8"?>
+<p:sld xmlns:a="http://schemas.openxmlformats.org/drawingml/2006/main" xmlns:r="http://schemas.openxmlformats.org/officeDocument/2006/relationships" xmlns:p="http://schemas.openxmlformats.org/presentationml/2006/main">
+  <p:cSld>
+    <p:spTree>
+      <p:nvGrpSpPr>
+        <p:cNvPr id="1" name=""/>
+        <p:cNvGrpSpPr/>
+        <p:nvPr/>
+      </p:nvGrpSpPr>
+      <p:grpSpPr>
+        <a:xfrm>
+          <a:off x="0" y="0"/>
+          <a:ext cx="0" cy="0"/>
+          <a:chOff x="0" y="0"/>
+          <a:chExt cx="0" cy="0"/>
+        </a:xfrm>
+      </p:grpSpPr>
+      <p:sp>
+        <p:nvSpPr>
+          <p:cNvPr id="2" name="Title 1">
+            <a:extLst>
+              <a:ext uri="{FF2B5EF4-FFF2-40B4-BE49-F238E27FC236}">
+                <a16:creationId xmlns:a16="http://schemas.microsoft.com/office/drawing/2014/main" id="{8B45E4C9-DB1E-4CA5-8EB5-78E59F7F1576}"/>
+              </a:ext>
+            </a:extLst>
+          </p:cNvPr>
+          <p:cNvSpPr>
+            <a:spLocks noGrp="1"/>
+          </p:cNvSpPr>
+          <p:nvPr>
+            <p:ph type="title"/>
+          </p:nvPr>
+        </p:nvSpPr>
+        <p:spPr/>
+        <p:txBody>
+          <a:bodyPr/>
+          <a:lstStyle/>
+          <a:p>
+            <a:r>
+              <a:rPr lang="en-US" dirty="0"/>
+              <a:t>App#1: Bootstrapping</a:t>
+            </a:r>
+          </a:p>
+        </p:txBody>
+      </p:sp>
+      <p:sp>
+        <p:nvSpPr>
+          <p:cNvPr id="4" name="Rectangle 3">
+            <a:extLst>
+              <a:ext uri="{FF2B5EF4-FFF2-40B4-BE49-F238E27FC236}">
+                <a16:creationId xmlns:a16="http://schemas.microsoft.com/office/drawing/2014/main" id="{037F585D-5DC2-4110-A2B0-75933C0FC0EB}"/>
+              </a:ext>
+            </a:extLst>
+          </p:cNvPr>
+          <p:cNvSpPr/>
+          <p:nvPr/>
+        </p:nvSpPr>
+        <p:spPr>
+          <a:xfrm>
+            <a:off x="152400" y="1379577"/>
+            <a:ext cx="8490066" cy="5478423"/>
+          </a:xfrm>
+          <a:prstGeom prst="rect">
+            <a:avLst/>
+          </a:prstGeom>
+        </p:spPr>
+        <p:txBody>
+          <a:bodyPr wrap="square">
+            <a:spAutoFit/>
+          </a:bodyPr>
+          <a:lstStyle/>
+          <a:p>
+            <a:r>
+              <a:rPr lang="en-US" dirty="0">
+                <a:solidFill>
+                  <a:srgbClr val="800000"/>
+                </a:solidFill>
+                <a:latin typeface="Consolas" panose="020B0609020204030204" pitchFamily="49" charset="0"/>
+              </a:rPr>
+              <a:t>&lt;!DOCTYPE</a:t>
+            </a:r>
+            <a:r>
+              <a:rPr lang="en-US" dirty="0">
+                <a:latin typeface="Consolas" panose="020B0609020204030204" pitchFamily="49" charset="0"/>
+              </a:rPr>
+              <a:t> </a:t>
+            </a:r>
+            <a:r>
+              <a:rPr lang="en-US" dirty="0">
+                <a:solidFill>
+                  <a:srgbClr val="FF0000"/>
+                </a:solidFill>
+                <a:latin typeface="Consolas" panose="020B0609020204030204" pitchFamily="49" charset="0"/>
+              </a:rPr>
+              <a:t>html</a:t>
+            </a:r>
+            <a:r>
+              <a:rPr lang="en-US" dirty="0">
+                <a:solidFill>
+                  <a:srgbClr val="800000"/>
+                </a:solidFill>
+                <a:latin typeface="Consolas" panose="020B0609020204030204" pitchFamily="49" charset="0"/>
+              </a:rPr>
+              <a:t>&gt;</a:t>
+            </a:r>
+            <a:endParaRPr lang="en-US" dirty="0">
+              <a:latin typeface="Consolas" panose="020B0609020204030204" pitchFamily="49" charset="0"/>
+            </a:endParaRPr>
+          </a:p>
+          <a:p>
+            <a:r>
+              <a:rPr lang="en-US" dirty="0">
+                <a:solidFill>
+                  <a:srgbClr val="800000"/>
+                </a:solidFill>
+                <a:latin typeface="Consolas" panose="020B0609020204030204" pitchFamily="49" charset="0"/>
+              </a:rPr>
+              <a:t>&lt;html&gt;</a:t>
+            </a:r>
+            <a:endParaRPr lang="en-US" dirty="0">
+              <a:latin typeface="Consolas" panose="020B0609020204030204" pitchFamily="49" charset="0"/>
+            </a:endParaRPr>
+          </a:p>
+          <a:p>
+            <a:r>
+              <a:rPr lang="en-US" dirty="0">
+                <a:latin typeface="Consolas" panose="020B0609020204030204" pitchFamily="49" charset="0"/>
+              </a:rPr>
+              <a:t>    </a:t>
+            </a:r>
+            <a:r>
+              <a:rPr lang="en-US" dirty="0">
+                <a:solidFill>
+                  <a:srgbClr val="800000"/>
+                </a:solidFill>
+                <a:latin typeface="Consolas" panose="020B0609020204030204" pitchFamily="49" charset="0"/>
+              </a:rPr>
+              <a:t>&lt;head&gt;</a:t>
+            </a:r>
+            <a:endParaRPr lang="en-US" dirty="0">
+              <a:latin typeface="Consolas" panose="020B0609020204030204" pitchFamily="49" charset="0"/>
+            </a:endParaRPr>
+          </a:p>
+          <a:p>
+            <a:r>
+              <a:rPr lang="en-US" dirty="0">
+                <a:latin typeface="Consolas" panose="020B0609020204030204" pitchFamily="49" charset="0"/>
+              </a:rPr>
+              <a:t>        </a:t>
+            </a:r>
+            <a:r>
+              <a:rPr lang="en-US" dirty="0">
+                <a:solidFill>
+                  <a:srgbClr val="800000"/>
+                </a:solidFill>
+                <a:latin typeface="Consolas" panose="020B0609020204030204" pitchFamily="49" charset="0"/>
+              </a:rPr>
+              <a:t>&lt;meta</a:t>
+            </a:r>
+            <a:r>
+              <a:rPr lang="en-US" dirty="0">
+                <a:latin typeface="Consolas" panose="020B0609020204030204" pitchFamily="49" charset="0"/>
+              </a:rPr>
+              <a:t> </a:t>
+            </a:r>
+            <a:r>
+              <a:rPr lang="en-US" dirty="0">
+                <a:solidFill>
+                  <a:srgbClr val="FF0000"/>
+                </a:solidFill>
+                <a:latin typeface="Consolas" panose="020B0609020204030204" pitchFamily="49" charset="0"/>
+              </a:rPr>
+              <a:t>charset</a:t>
+            </a:r>
+            <a:r>
+              <a:rPr lang="en-US" dirty="0">
+                <a:latin typeface="Consolas" panose="020B0609020204030204" pitchFamily="49" charset="0"/>
+              </a:rPr>
+              <a:t>=</a:t>
+            </a:r>
+            <a:r>
+              <a:rPr lang="en-US" dirty="0">
+                <a:solidFill>
+                  <a:srgbClr val="0000FF"/>
+                </a:solidFill>
+                <a:latin typeface="Consolas" panose="020B0609020204030204" pitchFamily="49" charset="0"/>
+              </a:rPr>
+              <a:t>"utf-8"</a:t>
+            </a:r>
+            <a:r>
+              <a:rPr lang="en-US" dirty="0">
+                <a:solidFill>
+                  <a:srgbClr val="800000"/>
+                </a:solidFill>
+                <a:latin typeface="Consolas" panose="020B0609020204030204" pitchFamily="49" charset="0"/>
+              </a:rPr>
+              <a:t>&gt;</a:t>
+            </a:r>
+            <a:endParaRPr lang="en-US" dirty="0">
+              <a:latin typeface="Consolas" panose="020B0609020204030204" pitchFamily="49" charset="0"/>
+            </a:endParaRPr>
+          </a:p>
+          <a:p>
+            <a:r>
+              <a:rPr lang="en-US" dirty="0">
+                <a:latin typeface="Consolas" panose="020B0609020204030204" pitchFamily="49" charset="0"/>
+              </a:rPr>
+              <a:t>        </a:t>
+            </a:r>
+            <a:r>
+              <a:rPr lang="en-US" dirty="0">
+                <a:solidFill>
+                  <a:srgbClr val="800000"/>
+                </a:solidFill>
+                <a:latin typeface="Consolas" panose="020B0609020204030204" pitchFamily="49" charset="0"/>
+              </a:rPr>
+              <a:t>&lt;title&gt;</a:t>
+            </a:r>
+            <a:r>
+              <a:rPr lang="en-US" dirty="0">
+                <a:latin typeface="Consolas" panose="020B0609020204030204" pitchFamily="49" charset="0"/>
+              </a:rPr>
+              <a:t>More </a:t>
+            </a:r>
+            <a:r>
+              <a:rPr lang="en-US" dirty="0" err="1">
+                <a:latin typeface="Consolas" panose="020B0609020204030204" pitchFamily="49" charset="0"/>
+              </a:rPr>
+              <a:t>Bootstarpping</a:t>
+            </a:r>
+            <a:r>
+              <a:rPr lang="en-US" dirty="0">
+                <a:solidFill>
+                  <a:srgbClr val="800000"/>
+                </a:solidFill>
+                <a:latin typeface="Consolas" panose="020B0609020204030204" pitchFamily="49" charset="0"/>
+              </a:rPr>
+              <a:t>&lt;/title&gt;</a:t>
+            </a:r>
+            <a:endParaRPr lang="en-US" dirty="0">
+              <a:latin typeface="Consolas" panose="020B0609020204030204" pitchFamily="49" charset="0"/>
+            </a:endParaRPr>
+          </a:p>
+          <a:p>
+            <a:r>
+              <a:rPr lang="en-US" dirty="0">
+                <a:latin typeface="Consolas" panose="020B0609020204030204" pitchFamily="49" charset="0"/>
+              </a:rPr>
+              <a:t>        </a:t>
+            </a:r>
+            <a:r>
+              <a:rPr lang="en-US" dirty="0">
+                <a:solidFill>
+                  <a:srgbClr val="92D050"/>
+                </a:solidFill>
+                <a:latin typeface="Consolas" panose="020B0609020204030204" pitchFamily="49" charset="0"/>
+              </a:rPr>
+              <a:t>// r</a:t>
+            </a:r>
+            <a:r>
+              <a:rPr lang="en-GB" dirty="0">
+                <a:solidFill>
+                  <a:srgbClr val="92D050"/>
+                </a:solidFill>
+              </a:rPr>
+              <a:t>efference to the latest stable version of OpenUI5, is not recommended for productive. </a:t>
+            </a:r>
+            <a:endParaRPr lang="en-US" dirty="0">
+              <a:solidFill>
+                <a:srgbClr val="92D050"/>
+              </a:solidFill>
+              <a:latin typeface="Consolas" panose="020B0609020204030204" pitchFamily="49" charset="0"/>
+            </a:endParaRPr>
+          </a:p>
+          <a:p>
+            <a:r>
+              <a:rPr lang="en-US" dirty="0">
+                <a:latin typeface="Consolas" panose="020B0609020204030204" pitchFamily="49" charset="0"/>
+              </a:rPr>
+              <a:t>        </a:t>
+            </a:r>
+            <a:r>
+              <a:rPr lang="en-US" dirty="0">
+                <a:solidFill>
+                  <a:srgbClr val="800000"/>
+                </a:solidFill>
+                <a:latin typeface="Consolas" panose="020B0609020204030204" pitchFamily="49" charset="0"/>
+              </a:rPr>
+              <a:t>&lt;script</a:t>
+            </a:r>
+            <a:endParaRPr lang="en-US" dirty="0">
+              <a:latin typeface="Consolas" panose="020B0609020204030204" pitchFamily="49" charset="0"/>
+            </a:endParaRPr>
+          </a:p>
+          <a:p>
+            <a:r>
+              <a:rPr lang="en-US" dirty="0">
+                <a:latin typeface="Consolas" panose="020B0609020204030204" pitchFamily="49" charset="0"/>
+              </a:rPr>
+              <a:t>            </a:t>
+            </a:r>
+            <a:r>
+              <a:rPr lang="en-US" dirty="0">
+                <a:solidFill>
+                  <a:srgbClr val="FF0000"/>
+                </a:solidFill>
+                <a:latin typeface="Consolas" panose="020B0609020204030204" pitchFamily="49" charset="0"/>
+              </a:rPr>
+              <a:t>id</a:t>
+            </a:r>
+            <a:r>
+              <a:rPr lang="en-US" dirty="0">
+                <a:latin typeface="Consolas" panose="020B0609020204030204" pitchFamily="49" charset="0"/>
+              </a:rPr>
+              <a:t>=</a:t>
+            </a:r>
+            <a:r>
+              <a:rPr lang="en-US" dirty="0">
+                <a:solidFill>
+                  <a:srgbClr val="0000FF"/>
+                </a:solidFill>
+                <a:latin typeface="Consolas" panose="020B0609020204030204" pitchFamily="49" charset="0"/>
+              </a:rPr>
+              <a:t>"sap-</a:t>
+            </a:r>
+            <a:r>
+              <a:rPr lang="en-US" dirty="0" err="1">
+                <a:solidFill>
+                  <a:srgbClr val="0000FF"/>
+                </a:solidFill>
+                <a:latin typeface="Consolas" panose="020B0609020204030204" pitchFamily="49" charset="0"/>
+              </a:rPr>
+              <a:t>ui</a:t>
+            </a:r>
+            <a:r>
+              <a:rPr lang="en-US" dirty="0">
+                <a:solidFill>
+                  <a:srgbClr val="0000FF"/>
+                </a:solidFill>
+                <a:latin typeface="Consolas" panose="020B0609020204030204" pitchFamily="49" charset="0"/>
+              </a:rPr>
+              <a:t>-bootstrap"</a:t>
+            </a:r>
+            <a:endParaRPr lang="en-US" dirty="0">
+              <a:latin typeface="Consolas" panose="020B0609020204030204" pitchFamily="49" charset="0"/>
+            </a:endParaRPr>
+          </a:p>
+          <a:p>
+            <a:r>
+              <a:rPr lang="en-US" dirty="0">
+                <a:latin typeface="Consolas" panose="020B0609020204030204" pitchFamily="49" charset="0"/>
+              </a:rPr>
+              <a:t>            </a:t>
+            </a:r>
+            <a:r>
+              <a:rPr lang="en-US" dirty="0" err="1">
+                <a:solidFill>
+                  <a:srgbClr val="FF0000"/>
+                </a:solidFill>
+                <a:latin typeface="Consolas" panose="020B0609020204030204" pitchFamily="49" charset="0"/>
+              </a:rPr>
+              <a:t>src</a:t>
+            </a:r>
+            <a:r>
+              <a:rPr lang="en-US" dirty="0">
+                <a:latin typeface="Consolas" panose="020B0609020204030204" pitchFamily="49" charset="0"/>
+              </a:rPr>
+              <a:t>=</a:t>
+            </a:r>
+            <a:r>
+              <a:rPr lang="en-US" dirty="0">
+                <a:solidFill>
+                  <a:srgbClr val="0000FF"/>
+                </a:solidFill>
+                <a:latin typeface="Consolas" panose="020B0609020204030204" pitchFamily="49" charset="0"/>
+              </a:rPr>
+              <a:t>"https://openui5.hana.ondemand.com/resources/sap-ui-core.js"</a:t>
+            </a:r>
+            <a:endParaRPr lang="en-US" dirty="0">
+              <a:latin typeface="Consolas" panose="020B0609020204030204" pitchFamily="49" charset="0"/>
+            </a:endParaRPr>
+          </a:p>
+          <a:p>
+            <a:r>
+              <a:rPr lang="en-US" dirty="0">
+                <a:latin typeface="Consolas" panose="020B0609020204030204" pitchFamily="49" charset="0"/>
+              </a:rPr>
+              <a:t>            </a:t>
+            </a:r>
+            <a:r>
+              <a:rPr lang="en-US" dirty="0">
+                <a:solidFill>
+                  <a:srgbClr val="FF0000"/>
+                </a:solidFill>
+                <a:latin typeface="Consolas" panose="020B0609020204030204" pitchFamily="49" charset="0"/>
+              </a:rPr>
+              <a:t>data-sap-</a:t>
+            </a:r>
+            <a:r>
+              <a:rPr lang="en-US" dirty="0" err="1">
+                <a:solidFill>
+                  <a:srgbClr val="FF0000"/>
+                </a:solidFill>
+                <a:latin typeface="Consolas" panose="020B0609020204030204" pitchFamily="49" charset="0"/>
+              </a:rPr>
+              <a:t>ui</a:t>
+            </a:r>
+            <a:r>
+              <a:rPr lang="en-US" dirty="0">
+                <a:solidFill>
+                  <a:srgbClr val="FF0000"/>
+                </a:solidFill>
+                <a:latin typeface="Consolas" panose="020B0609020204030204" pitchFamily="49" charset="0"/>
+              </a:rPr>
+              <a:t>-theme</a:t>
+            </a:r>
+            <a:r>
+              <a:rPr lang="en-US" dirty="0">
+                <a:latin typeface="Consolas" panose="020B0609020204030204" pitchFamily="49" charset="0"/>
+              </a:rPr>
+              <a:t>=</a:t>
+            </a:r>
+            <a:r>
+              <a:rPr lang="en-US" dirty="0">
+                <a:solidFill>
+                  <a:srgbClr val="0000FF"/>
+                </a:solidFill>
+                <a:latin typeface="Consolas" panose="020B0609020204030204" pitchFamily="49" charset="0"/>
+              </a:rPr>
+              <a:t>"</a:t>
+            </a:r>
+            <a:r>
+              <a:rPr lang="en-US" dirty="0" err="1">
+                <a:solidFill>
+                  <a:srgbClr val="0000FF"/>
+                </a:solidFill>
+                <a:latin typeface="Consolas" panose="020B0609020204030204" pitchFamily="49" charset="0"/>
+              </a:rPr>
+              <a:t>sap_belize</a:t>
+            </a:r>
+            <a:r>
+              <a:rPr lang="en-US" dirty="0">
+                <a:solidFill>
+                  <a:srgbClr val="0000FF"/>
+                </a:solidFill>
+                <a:latin typeface="Consolas" panose="020B0609020204030204" pitchFamily="49" charset="0"/>
+              </a:rPr>
+              <a:t>"</a:t>
+            </a:r>
+            <a:endParaRPr lang="en-US" dirty="0">
+              <a:latin typeface="Consolas" panose="020B0609020204030204" pitchFamily="49" charset="0"/>
+            </a:endParaRPr>
+          </a:p>
+          <a:p>
+            <a:r>
+              <a:rPr lang="en-US" dirty="0">
+                <a:latin typeface="Consolas" panose="020B0609020204030204" pitchFamily="49" charset="0"/>
+              </a:rPr>
+              <a:t>            </a:t>
+            </a:r>
+            <a:r>
+              <a:rPr lang="en-US" dirty="0">
+                <a:solidFill>
+                  <a:srgbClr val="FF0000"/>
+                </a:solidFill>
+                <a:latin typeface="Consolas" panose="020B0609020204030204" pitchFamily="49" charset="0"/>
+              </a:rPr>
+              <a:t>data-sap-</a:t>
+            </a:r>
+            <a:r>
+              <a:rPr lang="en-US" dirty="0" err="1">
+                <a:solidFill>
+                  <a:srgbClr val="FF0000"/>
+                </a:solidFill>
+                <a:latin typeface="Consolas" panose="020B0609020204030204" pitchFamily="49" charset="0"/>
+              </a:rPr>
+              <a:t>ui</a:t>
+            </a:r>
+            <a:r>
+              <a:rPr lang="en-US" dirty="0">
+                <a:solidFill>
+                  <a:srgbClr val="FF0000"/>
+                </a:solidFill>
+                <a:latin typeface="Consolas" panose="020B0609020204030204" pitchFamily="49" charset="0"/>
+              </a:rPr>
+              <a:t>-libs</a:t>
+            </a:r>
+            <a:r>
+              <a:rPr lang="en-US" dirty="0">
+                <a:latin typeface="Consolas" panose="020B0609020204030204" pitchFamily="49" charset="0"/>
+              </a:rPr>
+              <a:t>=</a:t>
+            </a:r>
+            <a:r>
+              <a:rPr lang="en-US" dirty="0">
+                <a:solidFill>
+                  <a:srgbClr val="0000FF"/>
+                </a:solidFill>
+                <a:latin typeface="Consolas" panose="020B0609020204030204" pitchFamily="49" charset="0"/>
+              </a:rPr>
+              <a:t>"</a:t>
+            </a:r>
+            <a:r>
+              <a:rPr lang="en-US" dirty="0" err="1">
+                <a:solidFill>
+                  <a:srgbClr val="0000FF"/>
+                </a:solidFill>
+                <a:latin typeface="Consolas" panose="020B0609020204030204" pitchFamily="49" charset="0"/>
+              </a:rPr>
+              <a:t>sap.m</a:t>
+            </a:r>
+            <a:r>
+              <a:rPr lang="en-US" dirty="0">
+                <a:solidFill>
+                  <a:srgbClr val="0000FF"/>
+                </a:solidFill>
+                <a:latin typeface="Consolas" panose="020B0609020204030204" pitchFamily="49" charset="0"/>
+              </a:rPr>
+              <a:t>"</a:t>
+            </a:r>
+            <a:endParaRPr lang="en-US" dirty="0">
+              <a:latin typeface="Consolas" panose="020B0609020204030204" pitchFamily="49" charset="0"/>
+            </a:endParaRPr>
+          </a:p>
+          <a:p>
+            <a:r>
+              <a:rPr lang="en-US" dirty="0">
+                <a:latin typeface="Consolas" panose="020B0609020204030204" pitchFamily="49" charset="0"/>
+              </a:rPr>
+              <a:t>            </a:t>
+            </a:r>
+            <a:r>
+              <a:rPr lang="en-US" dirty="0">
+                <a:solidFill>
+                  <a:srgbClr val="FF0000"/>
+                </a:solidFill>
+                <a:latin typeface="Consolas" panose="020B0609020204030204" pitchFamily="49" charset="0"/>
+              </a:rPr>
+              <a:t>data-sap-</a:t>
+            </a:r>
+            <a:r>
+              <a:rPr lang="en-US" dirty="0" err="1">
+                <a:solidFill>
+                  <a:srgbClr val="FF0000"/>
+                </a:solidFill>
+                <a:latin typeface="Consolas" panose="020B0609020204030204" pitchFamily="49" charset="0"/>
+              </a:rPr>
+              <a:t>ui</a:t>
+            </a:r>
+            <a:r>
+              <a:rPr lang="en-US" dirty="0">
+                <a:solidFill>
+                  <a:srgbClr val="FF0000"/>
+                </a:solidFill>
+                <a:latin typeface="Consolas" panose="020B0609020204030204" pitchFamily="49" charset="0"/>
+              </a:rPr>
+              <a:t>-</a:t>
+            </a:r>
+            <a:r>
+              <a:rPr lang="en-US" dirty="0" err="1">
+                <a:solidFill>
+                  <a:srgbClr val="FF0000"/>
+                </a:solidFill>
+                <a:latin typeface="Consolas" panose="020B0609020204030204" pitchFamily="49" charset="0"/>
+              </a:rPr>
+              <a:t>compatVersion</a:t>
+            </a:r>
+            <a:r>
+              <a:rPr lang="en-US" dirty="0">
+                <a:latin typeface="Consolas" panose="020B0609020204030204" pitchFamily="49" charset="0"/>
+              </a:rPr>
+              <a:t>=</a:t>
+            </a:r>
+            <a:r>
+              <a:rPr lang="en-US" dirty="0">
+                <a:solidFill>
+                  <a:srgbClr val="0000FF"/>
+                </a:solidFill>
+                <a:latin typeface="Consolas" panose="020B0609020204030204" pitchFamily="49" charset="0"/>
+              </a:rPr>
+              <a:t>"edge"</a:t>
+            </a:r>
+            <a:endParaRPr lang="en-US" dirty="0">
+              <a:latin typeface="Consolas" panose="020B0609020204030204" pitchFamily="49" charset="0"/>
+            </a:endParaRPr>
+          </a:p>
+          <a:p>
+            <a:r>
+              <a:rPr lang="en-US" dirty="0">
+                <a:latin typeface="Consolas" panose="020B0609020204030204" pitchFamily="49" charset="0"/>
+              </a:rPr>
+              <a:t>            </a:t>
+            </a:r>
+            <a:r>
+              <a:rPr lang="en-US" dirty="0">
+                <a:solidFill>
+                  <a:srgbClr val="FF0000"/>
+                </a:solidFill>
+                <a:latin typeface="Consolas" panose="020B0609020204030204" pitchFamily="49" charset="0"/>
+              </a:rPr>
+              <a:t>data-sap-</a:t>
+            </a:r>
+            <a:r>
+              <a:rPr lang="en-US" dirty="0" err="1">
+                <a:solidFill>
+                  <a:srgbClr val="FF0000"/>
+                </a:solidFill>
+                <a:latin typeface="Consolas" panose="020B0609020204030204" pitchFamily="49" charset="0"/>
+              </a:rPr>
+              <a:t>ui</a:t>
+            </a:r>
+            <a:r>
+              <a:rPr lang="en-US" dirty="0">
+                <a:solidFill>
+                  <a:srgbClr val="FF0000"/>
+                </a:solidFill>
+                <a:latin typeface="Consolas" panose="020B0609020204030204" pitchFamily="49" charset="0"/>
+              </a:rPr>
+              <a:t>-async</a:t>
+            </a:r>
+            <a:r>
+              <a:rPr lang="en-US" dirty="0">
+                <a:latin typeface="Consolas" panose="020B0609020204030204" pitchFamily="49" charset="0"/>
+              </a:rPr>
+              <a:t>=</a:t>
+            </a:r>
+            <a:r>
+              <a:rPr lang="en-US" dirty="0">
+                <a:solidFill>
+                  <a:srgbClr val="0000FF"/>
+                </a:solidFill>
+                <a:latin typeface="Consolas" panose="020B0609020204030204" pitchFamily="49" charset="0"/>
+              </a:rPr>
+              <a:t>"true"</a:t>
+            </a:r>
+            <a:endParaRPr lang="en-US" dirty="0">
+              <a:latin typeface="Consolas" panose="020B0609020204030204" pitchFamily="49" charset="0"/>
+            </a:endParaRPr>
+          </a:p>
+          <a:p>
+            <a:r>
+              <a:rPr lang="en-US" dirty="0">
+                <a:latin typeface="Consolas" panose="020B0609020204030204" pitchFamily="49" charset="0"/>
+              </a:rPr>
+              <a:t>            </a:t>
+            </a:r>
+            <a:r>
+              <a:rPr lang="en-US" dirty="0">
+                <a:solidFill>
+                  <a:srgbClr val="FF0000"/>
+                </a:solidFill>
+                <a:latin typeface="Consolas" panose="020B0609020204030204" pitchFamily="49" charset="0"/>
+              </a:rPr>
+              <a:t>data-sap-</a:t>
+            </a:r>
+            <a:r>
+              <a:rPr lang="en-US" dirty="0" err="1">
+                <a:solidFill>
+                  <a:srgbClr val="FF0000"/>
+                </a:solidFill>
+                <a:latin typeface="Consolas" panose="020B0609020204030204" pitchFamily="49" charset="0"/>
+              </a:rPr>
+              <a:t>ui</a:t>
+            </a:r>
+            <a:r>
+              <a:rPr lang="en-US" dirty="0">
+                <a:solidFill>
+                  <a:srgbClr val="FF0000"/>
+                </a:solidFill>
+                <a:latin typeface="Consolas" panose="020B0609020204030204" pitchFamily="49" charset="0"/>
+              </a:rPr>
+              <a:t>-</a:t>
+            </a:r>
+            <a:r>
+              <a:rPr lang="en-US" dirty="0" err="1">
+                <a:solidFill>
+                  <a:srgbClr val="FF0000"/>
+                </a:solidFill>
+                <a:latin typeface="Consolas" panose="020B0609020204030204" pitchFamily="49" charset="0"/>
+              </a:rPr>
+              <a:t>resourceroots</a:t>
+            </a:r>
+            <a:r>
+              <a:rPr lang="en-US" dirty="0">
+                <a:latin typeface="Consolas" panose="020B0609020204030204" pitchFamily="49" charset="0"/>
+              </a:rPr>
+              <a:t>=</a:t>
+            </a:r>
+            <a:r>
+              <a:rPr lang="en-US" dirty="0">
+                <a:solidFill>
+                  <a:srgbClr val="0000FF"/>
+                </a:solidFill>
+                <a:latin typeface="Consolas" panose="020B0609020204030204" pitchFamily="49" charset="0"/>
+              </a:rPr>
+              <a:t>'{</a:t>
+            </a:r>
+            <a:endParaRPr lang="en-US" dirty="0">
+              <a:latin typeface="Consolas" panose="020B0609020204030204" pitchFamily="49" charset="0"/>
+            </a:endParaRPr>
+          </a:p>
+          <a:p>
+            <a:r>
+              <a:rPr lang="en-US" dirty="0">
+                <a:solidFill>
+                  <a:srgbClr val="0000FF"/>
+                </a:solidFill>
+                <a:latin typeface="Consolas" panose="020B0609020204030204" pitchFamily="49" charset="0"/>
+              </a:rPr>
+              <a:t>                "com.mjzsoft.demo.ui5": "./"</a:t>
+            </a:r>
+            <a:endParaRPr lang="en-US" dirty="0">
+              <a:latin typeface="Consolas" panose="020B0609020204030204" pitchFamily="49" charset="0"/>
+            </a:endParaRPr>
+          </a:p>
+          <a:p>
+            <a:r>
+              <a:rPr lang="en-US" dirty="0">
+                <a:solidFill>
+                  <a:srgbClr val="0000FF"/>
+                </a:solidFill>
+                <a:latin typeface="Consolas" panose="020B0609020204030204" pitchFamily="49" charset="0"/>
+              </a:rPr>
+              <a:t>            }'</a:t>
+            </a:r>
+            <a:endParaRPr lang="en-US" dirty="0">
+              <a:latin typeface="Consolas" panose="020B0609020204030204" pitchFamily="49" charset="0"/>
+            </a:endParaRPr>
+          </a:p>
+          <a:p>
+            <a:r>
+              <a:rPr lang="en-US" dirty="0">
+                <a:latin typeface="Consolas" panose="020B0609020204030204" pitchFamily="49" charset="0"/>
+              </a:rPr>
+              <a:t>            </a:t>
+            </a:r>
+            <a:r>
+              <a:rPr lang="en-US" dirty="0">
+                <a:solidFill>
+                  <a:srgbClr val="FF0000"/>
+                </a:solidFill>
+                <a:latin typeface="Consolas" panose="020B0609020204030204" pitchFamily="49" charset="0"/>
+              </a:rPr>
+              <a:t>data-sap-</a:t>
+            </a:r>
+            <a:r>
+              <a:rPr lang="en-US" dirty="0" err="1">
+                <a:solidFill>
+                  <a:srgbClr val="FF0000"/>
+                </a:solidFill>
+                <a:latin typeface="Consolas" panose="020B0609020204030204" pitchFamily="49" charset="0"/>
+              </a:rPr>
+              <a:t>ui</a:t>
+            </a:r>
+            <a:r>
+              <a:rPr lang="en-US" dirty="0">
+                <a:solidFill>
+                  <a:srgbClr val="FF0000"/>
+                </a:solidFill>
+                <a:latin typeface="Consolas" panose="020B0609020204030204" pitchFamily="49" charset="0"/>
+              </a:rPr>
+              <a:t>-</a:t>
+            </a:r>
+            <a:r>
+              <a:rPr lang="en-US" dirty="0" err="1">
+                <a:solidFill>
+                  <a:srgbClr val="FF0000"/>
+                </a:solidFill>
+                <a:latin typeface="Consolas" panose="020B0609020204030204" pitchFamily="49" charset="0"/>
+              </a:rPr>
+              <a:t>oninit</a:t>
+            </a:r>
+            <a:r>
+              <a:rPr lang="en-US" dirty="0">
+                <a:latin typeface="Consolas" panose="020B0609020204030204" pitchFamily="49" charset="0"/>
+              </a:rPr>
+              <a:t>=</a:t>
+            </a:r>
+            <a:r>
+              <a:rPr lang="en-US" dirty="0">
+                <a:solidFill>
+                  <a:srgbClr val="0000FF"/>
+                </a:solidFill>
+                <a:latin typeface="Consolas" panose="020B0609020204030204" pitchFamily="49" charset="0"/>
+              </a:rPr>
+              <a:t>"</a:t>
+            </a:r>
+            <a:r>
+              <a:rPr lang="en-US" dirty="0" err="1">
+                <a:solidFill>
+                  <a:srgbClr val="0000FF"/>
+                </a:solidFill>
+                <a:latin typeface="Consolas" panose="020B0609020204030204" pitchFamily="49" charset="0"/>
+              </a:rPr>
+              <a:t>module:com</a:t>
+            </a:r>
+            <a:r>
+              <a:rPr lang="en-US" dirty="0">
+                <a:solidFill>
+                  <a:srgbClr val="0000FF"/>
+                </a:solidFill>
+                <a:latin typeface="Consolas" panose="020B0609020204030204" pitchFamily="49" charset="0"/>
+              </a:rPr>
+              <a:t>/</a:t>
+            </a:r>
+            <a:r>
+              <a:rPr lang="en-US" dirty="0" err="1">
+                <a:solidFill>
+                  <a:srgbClr val="0000FF"/>
+                </a:solidFill>
+                <a:latin typeface="Consolas" panose="020B0609020204030204" pitchFamily="49" charset="0"/>
+              </a:rPr>
+              <a:t>mjzsoft</a:t>
+            </a:r>
+            <a:r>
+              <a:rPr lang="en-US" dirty="0">
+                <a:solidFill>
+                  <a:srgbClr val="0000FF"/>
+                </a:solidFill>
+                <a:latin typeface="Consolas" panose="020B0609020204030204" pitchFamily="49" charset="0"/>
+              </a:rPr>
+              <a:t>/demo/ui5/index"</a:t>
+            </a:r>
+            <a:r>
+              <a:rPr lang="en-US" dirty="0">
+                <a:solidFill>
+                  <a:srgbClr val="800000"/>
+                </a:solidFill>
+                <a:latin typeface="Consolas" panose="020B0609020204030204" pitchFamily="49" charset="0"/>
+              </a:rPr>
+              <a:t>&gt;</a:t>
+            </a:r>
+            <a:endParaRPr lang="en-US" dirty="0">
+              <a:latin typeface="Consolas" panose="020B0609020204030204" pitchFamily="49" charset="0"/>
+            </a:endParaRPr>
+          </a:p>
+          <a:p>
+            <a:r>
+              <a:rPr lang="en-US" dirty="0">
+                <a:latin typeface="Consolas" panose="020B0609020204030204" pitchFamily="49" charset="0"/>
+              </a:rPr>
+              <a:t>        </a:t>
+            </a:r>
+            <a:r>
+              <a:rPr lang="en-US" dirty="0">
+                <a:solidFill>
+                  <a:srgbClr val="800000"/>
+                </a:solidFill>
+                <a:latin typeface="Consolas" panose="020B0609020204030204" pitchFamily="49" charset="0"/>
+              </a:rPr>
+              <a:t>&lt;/script&gt;</a:t>
+            </a:r>
+            <a:endParaRPr lang="en-US" dirty="0">
+              <a:latin typeface="Consolas" panose="020B0609020204030204" pitchFamily="49" charset="0"/>
+            </a:endParaRPr>
+          </a:p>
+          <a:p>
+            <a:r>
+              <a:rPr lang="en-US" dirty="0">
+                <a:latin typeface="Consolas" panose="020B0609020204030204" pitchFamily="49" charset="0"/>
+              </a:rPr>
+              <a:t>    </a:t>
+            </a:r>
+          </a:p>
+          <a:p>
+            <a:r>
+              <a:rPr lang="en-US" dirty="0">
+                <a:latin typeface="Consolas" panose="020B0609020204030204" pitchFamily="49" charset="0"/>
+              </a:rPr>
+              <a:t>    </a:t>
+            </a:r>
+            <a:r>
+              <a:rPr lang="en-US" dirty="0">
+                <a:solidFill>
+                  <a:srgbClr val="800000"/>
+                </a:solidFill>
+                <a:latin typeface="Consolas" panose="020B0609020204030204" pitchFamily="49" charset="0"/>
+              </a:rPr>
+              <a:t>&lt;/head&gt;</a:t>
+            </a:r>
+            <a:endParaRPr lang="en-US" dirty="0">
+              <a:latin typeface="Consolas" panose="020B0609020204030204" pitchFamily="49" charset="0"/>
+            </a:endParaRPr>
+          </a:p>
+          <a:p>
+            <a:r>
+              <a:rPr lang="en-US" dirty="0">
+                <a:latin typeface="Consolas" panose="020B0609020204030204" pitchFamily="49" charset="0"/>
+              </a:rPr>
+              <a:t>    </a:t>
+            </a:r>
+            <a:r>
+              <a:rPr lang="en-US" dirty="0">
+                <a:solidFill>
+                  <a:srgbClr val="800000"/>
+                </a:solidFill>
+                <a:latin typeface="Consolas" panose="020B0609020204030204" pitchFamily="49" charset="0"/>
+              </a:rPr>
+              <a:t>&lt;body&gt;</a:t>
+            </a:r>
+            <a:endParaRPr lang="en-US" dirty="0">
+              <a:latin typeface="Consolas" panose="020B0609020204030204" pitchFamily="49" charset="0"/>
+            </a:endParaRPr>
+          </a:p>
+          <a:p>
+            <a:r>
+              <a:rPr lang="en-US" dirty="0">
+                <a:latin typeface="Consolas" panose="020B0609020204030204" pitchFamily="49" charset="0"/>
+              </a:rPr>
+              <a:t>        </a:t>
+            </a:r>
+            <a:r>
+              <a:rPr lang="en-US" dirty="0">
+                <a:solidFill>
+                  <a:srgbClr val="800000"/>
+                </a:solidFill>
+                <a:latin typeface="Consolas" panose="020B0609020204030204" pitchFamily="49" charset="0"/>
+              </a:rPr>
+              <a:t>&lt;div&gt;</a:t>
+            </a:r>
+            <a:r>
+              <a:rPr lang="en-US" dirty="0">
+                <a:latin typeface="Consolas" panose="020B0609020204030204" pitchFamily="49" charset="0"/>
+              </a:rPr>
+              <a:t>Hello UI5 World</a:t>
+            </a:r>
+            <a:r>
+              <a:rPr lang="en-US" dirty="0">
+                <a:solidFill>
+                  <a:srgbClr val="800000"/>
+                </a:solidFill>
+                <a:latin typeface="Consolas" panose="020B0609020204030204" pitchFamily="49" charset="0"/>
+              </a:rPr>
+              <a:t>&lt;/div&gt;</a:t>
+            </a:r>
+            <a:endParaRPr lang="en-US" dirty="0">
+              <a:latin typeface="Consolas" panose="020B0609020204030204" pitchFamily="49" charset="0"/>
+            </a:endParaRPr>
+          </a:p>
+          <a:p>
+            <a:r>
+              <a:rPr lang="en-US" dirty="0">
+                <a:latin typeface="Consolas" panose="020B0609020204030204" pitchFamily="49" charset="0"/>
+              </a:rPr>
+              <a:t>        </a:t>
+            </a:r>
+            <a:r>
+              <a:rPr lang="en-US" dirty="0">
+                <a:solidFill>
+                  <a:srgbClr val="800000"/>
+                </a:solidFill>
+                <a:latin typeface="Consolas" panose="020B0609020204030204" pitchFamily="49" charset="0"/>
+              </a:rPr>
+              <a:t>&lt;div</a:t>
+            </a:r>
+            <a:r>
+              <a:rPr lang="en-US" dirty="0">
+                <a:latin typeface="Consolas" panose="020B0609020204030204" pitchFamily="49" charset="0"/>
+              </a:rPr>
+              <a:t> </a:t>
+            </a:r>
+            <a:r>
+              <a:rPr lang="en-US" dirty="0">
+                <a:solidFill>
+                  <a:srgbClr val="FF0000"/>
+                </a:solidFill>
+                <a:latin typeface="Consolas" panose="020B0609020204030204" pitchFamily="49" charset="0"/>
+              </a:rPr>
+              <a:t>id</a:t>
+            </a:r>
+            <a:r>
+              <a:rPr lang="en-US" dirty="0">
+                <a:latin typeface="Consolas" panose="020B0609020204030204" pitchFamily="49" charset="0"/>
+              </a:rPr>
+              <a:t>=</a:t>
+            </a:r>
+            <a:r>
+              <a:rPr lang="en-US" dirty="0">
+                <a:solidFill>
+                  <a:srgbClr val="0000FF"/>
+                </a:solidFill>
+                <a:latin typeface="Consolas" panose="020B0609020204030204" pitchFamily="49" charset="0"/>
+              </a:rPr>
+              <a:t>'alert'</a:t>
+            </a:r>
+            <a:r>
+              <a:rPr lang="en-US" dirty="0">
+                <a:solidFill>
+                  <a:srgbClr val="800000"/>
+                </a:solidFill>
+                <a:latin typeface="Consolas" panose="020B0609020204030204" pitchFamily="49" charset="0"/>
+              </a:rPr>
+              <a:t>&gt;</a:t>
+            </a:r>
+            <a:r>
+              <a:rPr lang="en-US" dirty="0">
+                <a:latin typeface="Consolas" panose="020B0609020204030204" pitchFamily="49" charset="0"/>
+              </a:rPr>
+              <a:t>Please wait!</a:t>
+            </a:r>
+            <a:r>
+              <a:rPr lang="en-US" dirty="0">
+                <a:solidFill>
+                  <a:srgbClr val="800000"/>
+                </a:solidFill>
+                <a:latin typeface="Consolas" panose="020B0609020204030204" pitchFamily="49" charset="0"/>
+              </a:rPr>
+              <a:t>&lt;/div&gt;</a:t>
+            </a:r>
+            <a:endParaRPr lang="en-US" dirty="0">
+              <a:latin typeface="Consolas" panose="020B0609020204030204" pitchFamily="49" charset="0"/>
+            </a:endParaRPr>
+          </a:p>
+          <a:p>
+            <a:r>
+              <a:rPr lang="en-US" dirty="0">
+                <a:latin typeface="Consolas" panose="020B0609020204030204" pitchFamily="49" charset="0"/>
+              </a:rPr>
+              <a:t>    </a:t>
+            </a:r>
+            <a:r>
+              <a:rPr lang="en-US" dirty="0">
+                <a:solidFill>
+                  <a:srgbClr val="800000"/>
+                </a:solidFill>
+                <a:latin typeface="Consolas" panose="020B0609020204030204" pitchFamily="49" charset="0"/>
+              </a:rPr>
+              <a:t>&lt;/body&gt;</a:t>
+            </a:r>
+            <a:endParaRPr lang="en-US" dirty="0">
+              <a:latin typeface="Consolas" panose="020B0609020204030204" pitchFamily="49" charset="0"/>
+            </a:endParaRPr>
+          </a:p>
+          <a:p>
+            <a:r>
+              <a:rPr lang="en-US" dirty="0">
+                <a:solidFill>
+                  <a:srgbClr val="800000"/>
+                </a:solidFill>
+                <a:latin typeface="Consolas" panose="020B0609020204030204" pitchFamily="49" charset="0"/>
+              </a:rPr>
+              <a:t>&lt;/html&gt;</a:t>
+            </a:r>
+            <a:endParaRPr lang="en-US" dirty="0">
+              <a:latin typeface="Consolas" panose="020B0609020204030204" pitchFamily="49" charset="0"/>
+            </a:endParaRPr>
+          </a:p>
+        </p:txBody>
+      </p:sp>
+    </p:spTree>
+    <p:extLst>
+      <p:ext uri="{BB962C8B-B14F-4D97-AF65-F5344CB8AC3E}">
+        <p14:creationId xmlns:p14="http://schemas.microsoft.com/office/powerpoint/2010/main" val="1261115273"/>
+      </p:ext>
+    </p:extLst>
+  </p:cSld>
+  <p:clrMapOvr>
+    <a:masterClrMapping/>
+  </p:clrMapOvr>
+</p:sld>
+</file>
+
+<file path=ppt/slides/slide12.xml><?xml version="1.0" encoding="utf-8"?>
+<p:sld xmlns:a="http://schemas.openxmlformats.org/drawingml/2006/main" xmlns:r="http://schemas.openxmlformats.org/officeDocument/2006/relationships" xmlns:p="http://schemas.openxmlformats.org/presentationml/2006/main">
+  <p:cSld>
+    <p:spTree>
+      <p:nvGrpSpPr>
+        <p:cNvPr id="1" name=""/>
+        <p:cNvGrpSpPr/>
+        <p:nvPr/>
+      </p:nvGrpSpPr>
+      <p:grpSpPr>
+        <a:xfrm>
+          <a:off x="0" y="0"/>
+          <a:ext cx="0" cy="0"/>
+          <a:chOff x="0" y="0"/>
+          <a:chExt cx="0" cy="0"/>
+        </a:xfrm>
+      </p:grpSpPr>
+      <p:sp>
+        <p:nvSpPr>
+          <p:cNvPr id="2" name="Title 1">
+            <a:extLst>
+              <a:ext uri="{FF2B5EF4-FFF2-40B4-BE49-F238E27FC236}">
+                <a16:creationId xmlns:a16="http://schemas.microsoft.com/office/drawing/2014/main" id="{8B45E4C9-DB1E-4CA5-8EB5-78E59F7F1576}"/>
+              </a:ext>
+            </a:extLst>
+          </p:cNvPr>
+          <p:cNvSpPr>
+            <a:spLocks noGrp="1"/>
+          </p:cNvSpPr>
+          <p:nvPr>
+            <p:ph type="title"/>
+          </p:nvPr>
+        </p:nvSpPr>
+        <p:spPr/>
+        <p:txBody>
+          <a:bodyPr/>
+          <a:lstStyle/>
+          <a:p>
+            <a:r>
+              <a:rPr lang="en-US" dirty="0"/>
+              <a:t>App#2: Xampp, MVC, Bootstrapping </a:t>
+            </a:r>
+          </a:p>
+        </p:txBody>
+      </p:sp>
+      <p:sp>
+        <p:nvSpPr>
+          <p:cNvPr id="3" name="Rectangle 2">
+            <a:extLst>
+              <a:ext uri="{FF2B5EF4-FFF2-40B4-BE49-F238E27FC236}">
+                <a16:creationId xmlns:a16="http://schemas.microsoft.com/office/drawing/2014/main" id="{0EAD6B99-FDF0-4163-990E-AE1F0F724AA2}"/>
+              </a:ext>
+            </a:extLst>
+          </p:cNvPr>
+          <p:cNvSpPr/>
+          <p:nvPr/>
+        </p:nvSpPr>
+        <p:spPr>
+          <a:xfrm>
+            <a:off x="160712" y="1252350"/>
+            <a:ext cx="9800491" cy="5909310"/>
+          </a:xfrm>
+          <a:prstGeom prst="rect">
+            <a:avLst/>
+          </a:prstGeom>
+        </p:spPr>
+        <p:txBody>
+          <a:bodyPr wrap="square">
+            <a:spAutoFit/>
+          </a:bodyPr>
+          <a:lstStyle/>
+          <a:p>
+            <a:r>
+              <a:rPr lang="en-US" dirty="0">
+                <a:solidFill>
+                  <a:srgbClr val="800000"/>
+                </a:solidFill>
+                <a:latin typeface="Consolas" panose="020B0609020204030204" pitchFamily="49" charset="0"/>
+              </a:rPr>
+              <a:t>&lt;!DOCTYPE</a:t>
+            </a:r>
+            <a:r>
+              <a:rPr lang="en-US" dirty="0">
+                <a:latin typeface="Consolas" panose="020B0609020204030204" pitchFamily="49" charset="0"/>
+              </a:rPr>
+              <a:t> </a:t>
+            </a:r>
+            <a:r>
+              <a:rPr lang="en-US" dirty="0">
+                <a:solidFill>
+                  <a:srgbClr val="FF0000"/>
+                </a:solidFill>
+                <a:latin typeface="Consolas" panose="020B0609020204030204" pitchFamily="49" charset="0"/>
+              </a:rPr>
+              <a:t>html</a:t>
+            </a:r>
+            <a:r>
+              <a:rPr lang="en-US" dirty="0">
+                <a:solidFill>
+                  <a:srgbClr val="800000"/>
+                </a:solidFill>
+                <a:latin typeface="Consolas" panose="020B0609020204030204" pitchFamily="49" charset="0"/>
+              </a:rPr>
+              <a:t>&gt;</a:t>
+            </a:r>
+            <a:endParaRPr lang="en-US" dirty="0">
+              <a:latin typeface="Consolas" panose="020B0609020204030204" pitchFamily="49" charset="0"/>
+            </a:endParaRPr>
+          </a:p>
+          <a:p>
+            <a:r>
+              <a:rPr lang="en-US" dirty="0">
+                <a:solidFill>
+                  <a:srgbClr val="800000"/>
+                </a:solidFill>
+                <a:latin typeface="Consolas" panose="020B0609020204030204" pitchFamily="49" charset="0"/>
+              </a:rPr>
+              <a:t>&lt;html&gt;</a:t>
+            </a:r>
+            <a:endParaRPr lang="en-US" dirty="0">
+              <a:latin typeface="Consolas" panose="020B0609020204030204" pitchFamily="49" charset="0"/>
+            </a:endParaRPr>
+          </a:p>
+          <a:p>
+            <a:r>
+              <a:rPr lang="en-US" dirty="0">
+                <a:latin typeface="Consolas" panose="020B0609020204030204" pitchFamily="49" charset="0"/>
+              </a:rPr>
+              <a:t>    </a:t>
+            </a:r>
+            <a:r>
+              <a:rPr lang="en-US" dirty="0">
+                <a:solidFill>
+                  <a:srgbClr val="800000"/>
+                </a:solidFill>
+                <a:latin typeface="Consolas" panose="020B0609020204030204" pitchFamily="49" charset="0"/>
+              </a:rPr>
+              <a:t>&lt;head&gt;</a:t>
+            </a:r>
+            <a:endParaRPr lang="en-US" dirty="0">
+              <a:latin typeface="Consolas" panose="020B0609020204030204" pitchFamily="49" charset="0"/>
+            </a:endParaRPr>
+          </a:p>
+          <a:p>
+            <a:r>
+              <a:rPr lang="en-US" dirty="0">
+                <a:latin typeface="Consolas" panose="020B0609020204030204" pitchFamily="49" charset="0"/>
+              </a:rPr>
+              <a:t>        </a:t>
+            </a:r>
+            <a:r>
+              <a:rPr lang="en-US" dirty="0">
+                <a:solidFill>
+                  <a:srgbClr val="800000"/>
+                </a:solidFill>
+                <a:latin typeface="Consolas" panose="020B0609020204030204" pitchFamily="49" charset="0"/>
+              </a:rPr>
+              <a:t>&lt;meta</a:t>
+            </a:r>
+            <a:r>
+              <a:rPr lang="en-US" dirty="0">
+                <a:latin typeface="Consolas" panose="020B0609020204030204" pitchFamily="49" charset="0"/>
+              </a:rPr>
+              <a:t> </a:t>
+            </a:r>
+            <a:r>
+              <a:rPr lang="en-US" dirty="0">
+                <a:solidFill>
+                  <a:srgbClr val="FF0000"/>
+                </a:solidFill>
+                <a:latin typeface="Consolas" panose="020B0609020204030204" pitchFamily="49" charset="0"/>
+              </a:rPr>
+              <a:t>charset</a:t>
+            </a:r>
+            <a:r>
+              <a:rPr lang="en-US" dirty="0">
+                <a:latin typeface="Consolas" panose="020B0609020204030204" pitchFamily="49" charset="0"/>
+              </a:rPr>
+              <a:t>=</a:t>
+            </a:r>
+            <a:r>
+              <a:rPr lang="en-US" dirty="0">
+                <a:solidFill>
+                  <a:srgbClr val="0000FF"/>
+                </a:solidFill>
+                <a:latin typeface="Consolas" panose="020B0609020204030204" pitchFamily="49" charset="0"/>
+              </a:rPr>
+              <a:t>"utf-8"</a:t>
+            </a:r>
+            <a:r>
+              <a:rPr lang="en-US" dirty="0">
+                <a:solidFill>
+                  <a:srgbClr val="800000"/>
+                </a:solidFill>
+                <a:latin typeface="Consolas" panose="020B0609020204030204" pitchFamily="49" charset="0"/>
+              </a:rPr>
+              <a:t>&gt;</a:t>
+            </a:r>
+            <a:endParaRPr lang="en-US" dirty="0">
+              <a:latin typeface="Consolas" panose="020B0609020204030204" pitchFamily="49" charset="0"/>
+            </a:endParaRPr>
+          </a:p>
+          <a:p>
+            <a:r>
+              <a:rPr lang="en-US" dirty="0">
+                <a:latin typeface="Consolas" panose="020B0609020204030204" pitchFamily="49" charset="0"/>
+              </a:rPr>
+              <a:t>        </a:t>
+            </a:r>
+            <a:r>
+              <a:rPr lang="en-US" dirty="0">
+                <a:solidFill>
+                  <a:srgbClr val="800000"/>
+                </a:solidFill>
+                <a:latin typeface="Consolas" panose="020B0609020204030204" pitchFamily="49" charset="0"/>
+              </a:rPr>
+              <a:t>&lt;title&gt;</a:t>
+            </a:r>
+            <a:r>
+              <a:rPr lang="en-US" dirty="0">
+                <a:latin typeface="Consolas" panose="020B0609020204030204" pitchFamily="49" charset="0"/>
+              </a:rPr>
+              <a:t>I Love UI5</a:t>
+            </a:r>
+            <a:r>
+              <a:rPr lang="en-US" dirty="0">
+                <a:solidFill>
+                  <a:srgbClr val="800000"/>
+                </a:solidFill>
+                <a:latin typeface="Consolas" panose="020B0609020204030204" pitchFamily="49" charset="0"/>
+              </a:rPr>
+              <a:t>&lt;/title&gt;</a:t>
+            </a:r>
+            <a:endParaRPr lang="en-US" dirty="0">
+              <a:latin typeface="Consolas" panose="020B0609020204030204" pitchFamily="49" charset="0"/>
+            </a:endParaRPr>
+          </a:p>
+          <a:p>
+            <a:r>
+              <a:rPr lang="en-US" dirty="0">
+                <a:latin typeface="Consolas" panose="020B0609020204030204" pitchFamily="49" charset="0"/>
+              </a:rPr>
+              <a:t>        </a:t>
+            </a:r>
+            <a:r>
+              <a:rPr lang="en-US" dirty="0">
+                <a:solidFill>
+                  <a:srgbClr val="800000"/>
+                </a:solidFill>
+                <a:latin typeface="Consolas" panose="020B0609020204030204" pitchFamily="49" charset="0"/>
+              </a:rPr>
+              <a:t>&lt;script</a:t>
+            </a:r>
+            <a:r>
+              <a:rPr lang="en-US" dirty="0">
+                <a:latin typeface="Consolas" panose="020B0609020204030204" pitchFamily="49" charset="0"/>
+              </a:rPr>
+              <a:t> </a:t>
+            </a:r>
+            <a:r>
+              <a:rPr lang="en-US" dirty="0">
+                <a:solidFill>
+                  <a:srgbClr val="FF0000"/>
+                </a:solidFill>
+                <a:latin typeface="Consolas" panose="020B0609020204030204" pitchFamily="49" charset="0"/>
+              </a:rPr>
+              <a:t>id</a:t>
+            </a:r>
+            <a:r>
+              <a:rPr lang="en-US" dirty="0">
+                <a:latin typeface="Consolas" panose="020B0609020204030204" pitchFamily="49" charset="0"/>
+              </a:rPr>
+              <a:t>=</a:t>
+            </a:r>
+            <a:r>
+              <a:rPr lang="en-US" dirty="0">
+                <a:solidFill>
+                  <a:srgbClr val="0000FF"/>
+                </a:solidFill>
+                <a:latin typeface="Consolas" panose="020B0609020204030204" pitchFamily="49" charset="0"/>
+              </a:rPr>
+              <a:t>"sap-</a:t>
+            </a:r>
+            <a:r>
+              <a:rPr lang="en-US" dirty="0" err="1">
+                <a:solidFill>
+                  <a:srgbClr val="0000FF"/>
+                </a:solidFill>
+                <a:latin typeface="Consolas" panose="020B0609020204030204" pitchFamily="49" charset="0"/>
+              </a:rPr>
+              <a:t>ui</a:t>
+            </a:r>
+            <a:r>
+              <a:rPr lang="en-US" dirty="0">
+                <a:solidFill>
+                  <a:srgbClr val="0000FF"/>
+                </a:solidFill>
+                <a:latin typeface="Consolas" panose="020B0609020204030204" pitchFamily="49" charset="0"/>
+              </a:rPr>
+              <a:t>-bootstrap"</a:t>
+            </a:r>
+            <a:endParaRPr lang="en-US" dirty="0">
+              <a:latin typeface="Consolas" panose="020B0609020204030204" pitchFamily="49" charset="0"/>
+            </a:endParaRPr>
+          </a:p>
+          <a:p>
+            <a:r>
+              <a:rPr lang="en-US" dirty="0">
+                <a:latin typeface="Consolas" panose="020B0609020204030204" pitchFamily="49" charset="0"/>
+              </a:rPr>
+              <a:t>            </a:t>
+            </a:r>
+            <a:r>
+              <a:rPr lang="en-US" dirty="0" err="1">
+                <a:solidFill>
+                  <a:srgbClr val="FF0000"/>
+                </a:solidFill>
+                <a:latin typeface="Consolas" panose="020B0609020204030204" pitchFamily="49" charset="0"/>
+              </a:rPr>
+              <a:t>src</a:t>
+            </a:r>
+            <a:r>
+              <a:rPr lang="en-US" dirty="0">
+                <a:latin typeface="Consolas" panose="020B0609020204030204" pitchFamily="49" charset="0"/>
+              </a:rPr>
+              <a:t>=</a:t>
+            </a:r>
+            <a:r>
+              <a:rPr lang="en-US" dirty="0">
+                <a:solidFill>
+                  <a:srgbClr val="0000FF"/>
+                </a:solidFill>
+                <a:latin typeface="Consolas" panose="020B0609020204030204" pitchFamily="49" charset="0"/>
+              </a:rPr>
+              <a:t>"https://openui5.hana.ondemand.com/resources/sap-ui-core.js"</a:t>
+            </a:r>
+            <a:endParaRPr lang="en-US" dirty="0">
+              <a:latin typeface="Consolas" panose="020B0609020204030204" pitchFamily="49" charset="0"/>
+            </a:endParaRPr>
+          </a:p>
+          <a:p>
+            <a:r>
+              <a:rPr lang="en-US" dirty="0">
+                <a:latin typeface="Consolas" panose="020B0609020204030204" pitchFamily="49" charset="0"/>
+              </a:rPr>
+              <a:t>            </a:t>
+            </a:r>
+            <a:r>
+              <a:rPr lang="en-US" dirty="0">
+                <a:solidFill>
+                  <a:srgbClr val="FF0000"/>
+                </a:solidFill>
+                <a:latin typeface="Consolas" panose="020B0609020204030204" pitchFamily="49" charset="0"/>
+              </a:rPr>
+              <a:t>data-sap-</a:t>
+            </a:r>
+            <a:r>
+              <a:rPr lang="en-US" dirty="0" err="1">
+                <a:solidFill>
+                  <a:srgbClr val="FF0000"/>
+                </a:solidFill>
+                <a:latin typeface="Consolas" panose="020B0609020204030204" pitchFamily="49" charset="0"/>
+              </a:rPr>
+              <a:t>ui</a:t>
+            </a:r>
+            <a:r>
+              <a:rPr lang="en-US" dirty="0">
+                <a:solidFill>
+                  <a:srgbClr val="FF0000"/>
+                </a:solidFill>
+                <a:latin typeface="Consolas" panose="020B0609020204030204" pitchFamily="49" charset="0"/>
+              </a:rPr>
+              <a:t>-theme</a:t>
+            </a:r>
+            <a:r>
+              <a:rPr lang="en-US" dirty="0">
+                <a:latin typeface="Consolas" panose="020B0609020204030204" pitchFamily="49" charset="0"/>
+              </a:rPr>
+              <a:t>=</a:t>
+            </a:r>
+            <a:r>
+              <a:rPr lang="en-US" dirty="0">
+                <a:solidFill>
+                  <a:srgbClr val="0000FF"/>
+                </a:solidFill>
+                <a:latin typeface="Consolas" panose="020B0609020204030204" pitchFamily="49" charset="0"/>
+              </a:rPr>
+              <a:t>"</a:t>
+            </a:r>
+            <a:r>
+              <a:rPr lang="en-US" dirty="0" err="1">
+                <a:solidFill>
+                  <a:srgbClr val="0000FF"/>
+                </a:solidFill>
+                <a:latin typeface="Consolas" panose="020B0609020204030204" pitchFamily="49" charset="0"/>
+              </a:rPr>
+              <a:t>sap_belize</a:t>
+            </a:r>
+            <a:r>
+              <a:rPr lang="en-US" dirty="0">
+                <a:solidFill>
+                  <a:srgbClr val="0000FF"/>
+                </a:solidFill>
+                <a:latin typeface="Consolas" panose="020B0609020204030204" pitchFamily="49" charset="0"/>
+              </a:rPr>
+              <a:t>"</a:t>
+            </a:r>
+            <a:endParaRPr lang="en-US" dirty="0">
+              <a:latin typeface="Consolas" panose="020B0609020204030204" pitchFamily="49" charset="0"/>
+            </a:endParaRPr>
+          </a:p>
+          <a:p>
+            <a:r>
+              <a:rPr lang="en-US" dirty="0">
+                <a:latin typeface="Consolas" panose="020B0609020204030204" pitchFamily="49" charset="0"/>
+              </a:rPr>
+              <a:t>            </a:t>
+            </a:r>
+            <a:r>
+              <a:rPr lang="en-US" dirty="0">
+                <a:solidFill>
+                  <a:srgbClr val="FF0000"/>
+                </a:solidFill>
+                <a:latin typeface="Consolas" panose="020B0609020204030204" pitchFamily="49" charset="0"/>
+              </a:rPr>
+              <a:t>data-sap-</a:t>
+            </a:r>
+            <a:r>
+              <a:rPr lang="en-US" dirty="0" err="1">
+                <a:solidFill>
+                  <a:srgbClr val="FF0000"/>
+                </a:solidFill>
+                <a:latin typeface="Consolas" panose="020B0609020204030204" pitchFamily="49" charset="0"/>
+              </a:rPr>
+              <a:t>ui</a:t>
+            </a:r>
+            <a:r>
+              <a:rPr lang="en-US" dirty="0">
+                <a:solidFill>
+                  <a:srgbClr val="FF0000"/>
+                </a:solidFill>
+                <a:latin typeface="Consolas" panose="020B0609020204030204" pitchFamily="49" charset="0"/>
+              </a:rPr>
+              <a:t>-libs</a:t>
+            </a:r>
+            <a:r>
+              <a:rPr lang="en-US" dirty="0">
+                <a:latin typeface="Consolas" panose="020B0609020204030204" pitchFamily="49" charset="0"/>
+              </a:rPr>
+              <a:t>=</a:t>
+            </a:r>
+            <a:r>
+              <a:rPr lang="en-US" dirty="0">
+                <a:solidFill>
+                  <a:srgbClr val="0000FF"/>
+                </a:solidFill>
+                <a:latin typeface="Consolas" panose="020B0609020204030204" pitchFamily="49" charset="0"/>
+              </a:rPr>
+              <a:t>"</a:t>
+            </a:r>
+            <a:r>
+              <a:rPr lang="en-US" dirty="0" err="1">
+                <a:solidFill>
+                  <a:srgbClr val="0000FF"/>
+                </a:solidFill>
+                <a:latin typeface="Consolas" panose="020B0609020204030204" pitchFamily="49" charset="0"/>
+              </a:rPr>
+              <a:t>sap.m</a:t>
+            </a:r>
+            <a:r>
+              <a:rPr lang="en-US" dirty="0">
+                <a:solidFill>
+                  <a:srgbClr val="0000FF"/>
+                </a:solidFill>
+                <a:latin typeface="Consolas" panose="020B0609020204030204" pitchFamily="49" charset="0"/>
+              </a:rPr>
+              <a:t>"</a:t>
+            </a:r>
+            <a:endParaRPr lang="en-US" dirty="0">
+              <a:latin typeface="Consolas" panose="020B0609020204030204" pitchFamily="49" charset="0"/>
+            </a:endParaRPr>
+          </a:p>
+          <a:p>
+            <a:r>
+              <a:rPr lang="en-US" dirty="0">
+                <a:latin typeface="Consolas" panose="020B0609020204030204" pitchFamily="49" charset="0"/>
+              </a:rPr>
+              <a:t>            </a:t>
+            </a:r>
+            <a:r>
+              <a:rPr lang="en-US" dirty="0">
+                <a:solidFill>
+                  <a:srgbClr val="FF0000"/>
+                </a:solidFill>
+                <a:latin typeface="Consolas" panose="020B0609020204030204" pitchFamily="49" charset="0"/>
+              </a:rPr>
+              <a:t>data-sap-</a:t>
+            </a:r>
+            <a:r>
+              <a:rPr lang="en-US" dirty="0" err="1">
+                <a:solidFill>
+                  <a:srgbClr val="FF0000"/>
+                </a:solidFill>
+                <a:latin typeface="Consolas" panose="020B0609020204030204" pitchFamily="49" charset="0"/>
+              </a:rPr>
+              <a:t>ui</a:t>
+            </a:r>
+            <a:r>
+              <a:rPr lang="en-US" dirty="0">
+                <a:solidFill>
+                  <a:srgbClr val="FF0000"/>
+                </a:solidFill>
+                <a:latin typeface="Consolas" panose="020B0609020204030204" pitchFamily="49" charset="0"/>
+              </a:rPr>
+              <a:t>-</a:t>
+            </a:r>
+            <a:r>
+              <a:rPr lang="en-US" dirty="0" err="1">
+                <a:solidFill>
+                  <a:srgbClr val="FF0000"/>
+                </a:solidFill>
+                <a:latin typeface="Consolas" panose="020B0609020204030204" pitchFamily="49" charset="0"/>
+              </a:rPr>
+              <a:t>resourceroots</a:t>
+            </a:r>
+            <a:r>
+              <a:rPr lang="en-US" dirty="0">
+                <a:latin typeface="Consolas" panose="020B0609020204030204" pitchFamily="49" charset="0"/>
+              </a:rPr>
+              <a:t>=</a:t>
+            </a:r>
+            <a:r>
+              <a:rPr lang="en-US" dirty="0">
+                <a:solidFill>
+                  <a:srgbClr val="0000FF"/>
+                </a:solidFill>
+                <a:latin typeface="Consolas" panose="020B0609020204030204" pitchFamily="49" charset="0"/>
+              </a:rPr>
+              <a:t>'{"</a:t>
+            </a:r>
+            <a:r>
+              <a:rPr lang="en-US" dirty="0" err="1">
+                <a:solidFill>
+                  <a:srgbClr val="0000FF"/>
+                </a:solidFill>
+                <a:latin typeface="Consolas" panose="020B0609020204030204" pitchFamily="49" charset="0"/>
+              </a:rPr>
+              <a:t>com.mjzsoft</a:t>
+            </a:r>
+            <a:r>
+              <a:rPr lang="en-US" dirty="0">
+                <a:solidFill>
+                  <a:srgbClr val="0000FF"/>
+                </a:solidFill>
+                <a:latin typeface="Consolas" panose="020B0609020204030204" pitchFamily="49" charset="0"/>
+              </a:rPr>
+              <a:t>": "./"}'</a:t>
+            </a:r>
+            <a:endParaRPr lang="en-US" dirty="0">
+              <a:latin typeface="Consolas" panose="020B0609020204030204" pitchFamily="49" charset="0"/>
+            </a:endParaRPr>
+          </a:p>
+          <a:p>
+            <a:r>
+              <a:rPr lang="en-US" dirty="0">
+                <a:latin typeface="Consolas" panose="020B0609020204030204" pitchFamily="49" charset="0"/>
+              </a:rPr>
+              <a:t>            </a:t>
+            </a:r>
+            <a:r>
+              <a:rPr lang="en-US" dirty="0">
+                <a:solidFill>
+                  <a:srgbClr val="FF0000"/>
+                </a:solidFill>
+                <a:latin typeface="Consolas" panose="020B0609020204030204" pitchFamily="49" charset="0"/>
+              </a:rPr>
+              <a:t>data-sap-</a:t>
+            </a:r>
+            <a:r>
+              <a:rPr lang="en-US" dirty="0" err="1">
+                <a:solidFill>
+                  <a:srgbClr val="FF0000"/>
+                </a:solidFill>
+                <a:latin typeface="Consolas" panose="020B0609020204030204" pitchFamily="49" charset="0"/>
+              </a:rPr>
+              <a:t>ui</a:t>
+            </a:r>
+            <a:r>
+              <a:rPr lang="en-US" dirty="0">
+                <a:solidFill>
+                  <a:srgbClr val="FF0000"/>
+                </a:solidFill>
+                <a:latin typeface="Consolas" panose="020B0609020204030204" pitchFamily="49" charset="0"/>
+              </a:rPr>
+              <a:t>-async</a:t>
+            </a:r>
+            <a:r>
+              <a:rPr lang="en-US" dirty="0">
+                <a:latin typeface="Consolas" panose="020B0609020204030204" pitchFamily="49" charset="0"/>
+              </a:rPr>
+              <a:t>=</a:t>
+            </a:r>
+            <a:r>
+              <a:rPr lang="en-US" dirty="0">
+                <a:solidFill>
+                  <a:srgbClr val="0000FF"/>
+                </a:solidFill>
+                <a:latin typeface="Consolas" panose="020B0609020204030204" pitchFamily="49" charset="0"/>
+              </a:rPr>
+              <a:t>"true"</a:t>
+            </a:r>
+            <a:r>
+              <a:rPr lang="en-US" dirty="0">
+                <a:solidFill>
+                  <a:srgbClr val="800000"/>
+                </a:solidFill>
+                <a:latin typeface="Consolas" panose="020B0609020204030204" pitchFamily="49" charset="0"/>
+              </a:rPr>
+              <a:t>&gt;</a:t>
+            </a:r>
+            <a:endParaRPr lang="en-US" dirty="0">
+              <a:latin typeface="Consolas" panose="020B0609020204030204" pitchFamily="49" charset="0"/>
+            </a:endParaRPr>
+          </a:p>
+          <a:p>
+            <a:r>
+              <a:rPr lang="en-US" dirty="0">
+                <a:latin typeface="Consolas" panose="020B0609020204030204" pitchFamily="49" charset="0"/>
+              </a:rPr>
+              <a:t>        </a:t>
+            </a:r>
+            <a:r>
+              <a:rPr lang="en-US" dirty="0">
+                <a:solidFill>
+                  <a:srgbClr val="800000"/>
+                </a:solidFill>
+                <a:latin typeface="Consolas" panose="020B0609020204030204" pitchFamily="49" charset="0"/>
+              </a:rPr>
+              <a:t>&lt;/script&gt;</a:t>
+            </a:r>
+            <a:endParaRPr lang="en-US" dirty="0">
+              <a:latin typeface="Consolas" panose="020B0609020204030204" pitchFamily="49" charset="0"/>
+            </a:endParaRPr>
+          </a:p>
+          <a:p>
+            <a:r>
+              <a:rPr lang="en-US" dirty="0">
+                <a:latin typeface="Consolas" panose="020B0609020204030204" pitchFamily="49" charset="0"/>
+              </a:rPr>
+              <a:t>        </a:t>
+            </a:r>
+            <a:r>
+              <a:rPr lang="en-US" dirty="0">
+                <a:solidFill>
+                  <a:srgbClr val="800000"/>
+                </a:solidFill>
+                <a:latin typeface="Consolas" panose="020B0609020204030204" pitchFamily="49" charset="0"/>
+              </a:rPr>
+              <a:t>&lt;script&gt;</a:t>
+            </a:r>
+            <a:endParaRPr lang="en-US" dirty="0">
+              <a:latin typeface="Consolas" panose="020B0609020204030204" pitchFamily="49" charset="0"/>
+            </a:endParaRPr>
+          </a:p>
+          <a:p>
+            <a:r>
+              <a:rPr lang="en-US" dirty="0">
+                <a:latin typeface="Consolas" panose="020B0609020204030204" pitchFamily="49" charset="0"/>
+              </a:rPr>
+              <a:t>            </a:t>
+            </a:r>
+            <a:r>
+              <a:rPr lang="en-US" dirty="0" err="1">
+                <a:latin typeface="Consolas" panose="020B0609020204030204" pitchFamily="49" charset="0"/>
+              </a:rPr>
+              <a:t>sap.ui.getCore</a:t>
+            </a:r>
+            <a:r>
+              <a:rPr lang="en-US" dirty="0">
+                <a:latin typeface="Consolas" panose="020B0609020204030204" pitchFamily="49" charset="0"/>
+              </a:rPr>
+              <a:t>().</a:t>
+            </a:r>
+            <a:r>
+              <a:rPr lang="en-US" dirty="0" err="1">
+                <a:latin typeface="Consolas" panose="020B0609020204030204" pitchFamily="49" charset="0"/>
+              </a:rPr>
+              <a:t>attachInit</a:t>
+            </a:r>
+            <a:r>
+              <a:rPr lang="en-US" dirty="0">
+                <a:latin typeface="Consolas" panose="020B0609020204030204" pitchFamily="49" charset="0"/>
+              </a:rPr>
+              <a:t>(</a:t>
+            </a:r>
+            <a:r>
+              <a:rPr lang="en-US" dirty="0">
+                <a:solidFill>
+                  <a:srgbClr val="0000FF"/>
+                </a:solidFill>
+                <a:latin typeface="Consolas" panose="020B0609020204030204" pitchFamily="49" charset="0"/>
+              </a:rPr>
+              <a:t>function</a:t>
+            </a:r>
+            <a:r>
+              <a:rPr lang="en-US" dirty="0">
+                <a:latin typeface="Consolas" panose="020B0609020204030204" pitchFamily="49" charset="0"/>
+              </a:rPr>
+              <a:t> () {</a:t>
+            </a:r>
+          </a:p>
+          <a:p>
+            <a:r>
+              <a:rPr lang="en-US" dirty="0">
+                <a:latin typeface="Consolas" panose="020B0609020204030204" pitchFamily="49" charset="0"/>
+              </a:rPr>
+              <a:t>                </a:t>
+            </a:r>
+            <a:r>
+              <a:rPr lang="en-US" dirty="0" err="1">
+                <a:latin typeface="Consolas" panose="020B0609020204030204" pitchFamily="49" charset="0"/>
+              </a:rPr>
+              <a:t>sap.ui.require</a:t>
+            </a:r>
+            <a:r>
+              <a:rPr lang="en-US" dirty="0">
+                <a:latin typeface="Consolas" panose="020B0609020204030204" pitchFamily="49" charset="0"/>
+              </a:rPr>
+              <a:t>([</a:t>
+            </a:r>
+          </a:p>
+          <a:p>
+            <a:r>
+              <a:rPr lang="en-US" dirty="0">
+                <a:latin typeface="Consolas" panose="020B0609020204030204" pitchFamily="49" charset="0"/>
+              </a:rPr>
+              <a:t>                    </a:t>
+            </a:r>
+            <a:r>
+              <a:rPr lang="en-US" dirty="0">
+                <a:solidFill>
+                  <a:srgbClr val="A31515"/>
+                </a:solidFill>
+                <a:latin typeface="Consolas" panose="020B0609020204030204" pitchFamily="49" charset="0"/>
+              </a:rPr>
+              <a:t>"sap/</a:t>
+            </a:r>
+            <a:r>
+              <a:rPr lang="en-US" dirty="0" err="1">
+                <a:solidFill>
+                  <a:srgbClr val="A31515"/>
+                </a:solidFill>
+                <a:latin typeface="Consolas" panose="020B0609020204030204" pitchFamily="49" charset="0"/>
+              </a:rPr>
+              <a:t>ui</a:t>
+            </a:r>
+            <a:r>
+              <a:rPr lang="en-US" dirty="0">
+                <a:solidFill>
+                  <a:srgbClr val="A31515"/>
+                </a:solidFill>
+                <a:latin typeface="Consolas" panose="020B0609020204030204" pitchFamily="49" charset="0"/>
+              </a:rPr>
+              <a:t>/core/</a:t>
+            </a:r>
+            <a:r>
+              <a:rPr lang="en-US" dirty="0" err="1">
+                <a:solidFill>
+                  <a:srgbClr val="A31515"/>
+                </a:solidFill>
+                <a:latin typeface="Consolas" panose="020B0609020204030204" pitchFamily="49" charset="0"/>
+              </a:rPr>
+              <a:t>mvc</a:t>
+            </a:r>
+            <a:r>
+              <a:rPr lang="en-US" dirty="0">
+                <a:solidFill>
+                  <a:srgbClr val="A31515"/>
+                </a:solidFill>
+                <a:latin typeface="Consolas" panose="020B0609020204030204" pitchFamily="49" charset="0"/>
+              </a:rPr>
+              <a:t>/</a:t>
+            </a:r>
+            <a:r>
+              <a:rPr lang="en-US" dirty="0" err="1">
+                <a:solidFill>
+                  <a:srgbClr val="A31515"/>
+                </a:solidFill>
+                <a:latin typeface="Consolas" panose="020B0609020204030204" pitchFamily="49" charset="0"/>
+              </a:rPr>
+              <a:t>XMLView</a:t>
+            </a:r>
+            <a:r>
+              <a:rPr lang="en-US" dirty="0">
+                <a:solidFill>
+                  <a:srgbClr val="A31515"/>
+                </a:solidFill>
+                <a:latin typeface="Consolas" panose="020B0609020204030204" pitchFamily="49" charset="0"/>
+              </a:rPr>
+              <a:t>"</a:t>
+            </a:r>
+            <a:endParaRPr lang="en-US" dirty="0">
+              <a:latin typeface="Consolas" panose="020B0609020204030204" pitchFamily="49" charset="0"/>
+            </a:endParaRPr>
+          </a:p>
+          <a:p>
+            <a:r>
+              <a:rPr lang="en-US" dirty="0">
+                <a:latin typeface="Consolas" panose="020B0609020204030204" pitchFamily="49" charset="0"/>
+              </a:rPr>
+              <a:t>                ], </a:t>
+            </a:r>
+            <a:r>
+              <a:rPr lang="en-US" dirty="0">
+                <a:solidFill>
+                  <a:srgbClr val="0000FF"/>
+                </a:solidFill>
+                <a:latin typeface="Consolas" panose="020B0609020204030204" pitchFamily="49" charset="0"/>
+              </a:rPr>
+              <a:t>function</a:t>
+            </a:r>
+            <a:r>
+              <a:rPr lang="en-US" dirty="0">
+                <a:latin typeface="Consolas" panose="020B0609020204030204" pitchFamily="49" charset="0"/>
+              </a:rPr>
+              <a:t> (</a:t>
+            </a:r>
+            <a:r>
+              <a:rPr lang="en-US" dirty="0" err="1">
+                <a:latin typeface="Consolas" panose="020B0609020204030204" pitchFamily="49" charset="0"/>
+              </a:rPr>
+              <a:t>XMLView</a:t>
+            </a:r>
+            <a:r>
+              <a:rPr lang="en-US" dirty="0">
+                <a:latin typeface="Consolas" panose="020B0609020204030204" pitchFamily="49" charset="0"/>
+              </a:rPr>
+              <a:t>) {</a:t>
+            </a:r>
+          </a:p>
+          <a:p>
+            <a:r>
+              <a:rPr lang="en-US" dirty="0">
+                <a:latin typeface="Consolas" panose="020B0609020204030204" pitchFamily="49" charset="0"/>
+              </a:rPr>
+              <a:t>                    </a:t>
+            </a:r>
+            <a:r>
+              <a:rPr lang="en-US" dirty="0" err="1">
+                <a:latin typeface="Consolas" panose="020B0609020204030204" pitchFamily="49" charset="0"/>
+              </a:rPr>
+              <a:t>XMLView.create</a:t>
+            </a:r>
+            <a:r>
+              <a:rPr lang="en-US" dirty="0">
+                <a:latin typeface="Consolas" panose="020B0609020204030204" pitchFamily="49" charset="0"/>
+              </a:rPr>
+              <a:t>({</a:t>
+            </a:r>
+            <a:r>
+              <a:rPr lang="en-US" dirty="0" err="1">
+                <a:latin typeface="Consolas" panose="020B0609020204030204" pitchFamily="49" charset="0"/>
+              </a:rPr>
+              <a:t>viewName</a:t>
+            </a:r>
+            <a:r>
+              <a:rPr lang="en-US" dirty="0">
+                <a:latin typeface="Consolas" panose="020B0609020204030204" pitchFamily="49" charset="0"/>
+              </a:rPr>
+              <a:t>: </a:t>
+            </a:r>
+            <a:r>
+              <a:rPr lang="en-US" dirty="0">
+                <a:solidFill>
+                  <a:srgbClr val="A31515"/>
+                </a:solidFill>
+                <a:latin typeface="Consolas" panose="020B0609020204030204" pitchFamily="49" charset="0"/>
+              </a:rPr>
+              <a:t>"</a:t>
+            </a:r>
+            <a:r>
+              <a:rPr lang="en-US" dirty="0" err="1">
+                <a:solidFill>
+                  <a:srgbClr val="A31515"/>
+                </a:solidFill>
+                <a:latin typeface="Consolas" panose="020B0609020204030204" pitchFamily="49" charset="0"/>
+              </a:rPr>
+              <a:t>com.mjzsoft.App</a:t>
+            </a:r>
+            <a:r>
+              <a:rPr lang="en-US" dirty="0">
+                <a:solidFill>
+                  <a:srgbClr val="A31515"/>
+                </a:solidFill>
+                <a:latin typeface="Consolas" panose="020B0609020204030204" pitchFamily="49" charset="0"/>
+              </a:rPr>
+              <a:t>"</a:t>
+            </a:r>
+            <a:r>
+              <a:rPr lang="en-US" dirty="0">
+                <a:latin typeface="Consolas" panose="020B0609020204030204" pitchFamily="49" charset="0"/>
+              </a:rPr>
+              <a:t>}).then(</a:t>
+            </a:r>
+            <a:r>
+              <a:rPr lang="en-US" dirty="0">
+                <a:solidFill>
+                  <a:srgbClr val="0000FF"/>
+                </a:solidFill>
+                <a:latin typeface="Consolas" panose="020B0609020204030204" pitchFamily="49" charset="0"/>
+              </a:rPr>
+              <a:t>function</a:t>
+            </a:r>
+            <a:r>
+              <a:rPr lang="en-US" dirty="0">
+                <a:latin typeface="Consolas" panose="020B0609020204030204" pitchFamily="49" charset="0"/>
+              </a:rPr>
+              <a:t> (</a:t>
+            </a:r>
+            <a:r>
+              <a:rPr lang="en-US" dirty="0" err="1">
+                <a:latin typeface="Consolas" panose="020B0609020204030204" pitchFamily="49" charset="0"/>
+              </a:rPr>
+              <a:t>oView</a:t>
+            </a:r>
+            <a:r>
+              <a:rPr lang="en-US" dirty="0">
+                <a:latin typeface="Consolas" panose="020B0609020204030204" pitchFamily="49" charset="0"/>
+              </a:rPr>
+              <a:t>) {</a:t>
+            </a:r>
+          </a:p>
+          <a:p>
+            <a:r>
+              <a:rPr lang="en-US" dirty="0">
+                <a:latin typeface="Consolas" panose="020B0609020204030204" pitchFamily="49" charset="0"/>
+              </a:rPr>
+              <a:t>                        </a:t>
+            </a:r>
+            <a:r>
+              <a:rPr lang="en-US" dirty="0" err="1">
+                <a:latin typeface="Consolas" panose="020B0609020204030204" pitchFamily="49" charset="0"/>
+              </a:rPr>
+              <a:t>oView.placeAt</a:t>
+            </a:r>
+            <a:r>
+              <a:rPr lang="en-US" dirty="0">
+                <a:latin typeface="Consolas" panose="020B0609020204030204" pitchFamily="49" charset="0"/>
+              </a:rPr>
+              <a:t>(</a:t>
+            </a:r>
+            <a:r>
+              <a:rPr lang="en-US" dirty="0">
+                <a:solidFill>
+                  <a:srgbClr val="A31515"/>
+                </a:solidFill>
+                <a:latin typeface="Consolas" panose="020B0609020204030204" pitchFamily="49" charset="0"/>
+              </a:rPr>
+              <a:t>"content"</a:t>
+            </a:r>
+            <a:r>
+              <a:rPr lang="en-US" dirty="0">
+                <a:latin typeface="Consolas" panose="020B0609020204030204" pitchFamily="49" charset="0"/>
+              </a:rPr>
+              <a:t>);</a:t>
+            </a:r>
+          </a:p>
+          <a:p>
+            <a:r>
+              <a:rPr lang="en-US" dirty="0">
+                <a:latin typeface="Consolas" panose="020B0609020204030204" pitchFamily="49" charset="0"/>
+              </a:rPr>
+              <a:t>                    });</a:t>
+            </a:r>
+          </a:p>
+          <a:p>
+            <a:r>
+              <a:rPr lang="en-US" dirty="0">
+                <a:latin typeface="Consolas" panose="020B0609020204030204" pitchFamily="49" charset="0"/>
+              </a:rPr>
+              <a:t>                });</a:t>
+            </a:r>
+          </a:p>
+          <a:p>
+            <a:r>
+              <a:rPr lang="en-US" dirty="0">
+                <a:latin typeface="Consolas" panose="020B0609020204030204" pitchFamily="49" charset="0"/>
+              </a:rPr>
+              <a:t>            });</a:t>
+            </a:r>
+          </a:p>
+          <a:p>
+            <a:r>
+              <a:rPr lang="en-US" dirty="0">
+                <a:latin typeface="Consolas" panose="020B0609020204030204" pitchFamily="49" charset="0"/>
+              </a:rPr>
+              <a:t>        </a:t>
+            </a:r>
+            <a:r>
+              <a:rPr lang="en-US" dirty="0">
+                <a:solidFill>
+                  <a:srgbClr val="800000"/>
+                </a:solidFill>
+                <a:latin typeface="Consolas" panose="020B0609020204030204" pitchFamily="49" charset="0"/>
+              </a:rPr>
+              <a:t>&lt;/script&gt;</a:t>
+            </a:r>
+            <a:endParaRPr lang="en-US" dirty="0">
+              <a:latin typeface="Consolas" panose="020B0609020204030204" pitchFamily="49" charset="0"/>
+            </a:endParaRPr>
+          </a:p>
+          <a:p>
+            <a:r>
+              <a:rPr lang="en-US" dirty="0">
+                <a:latin typeface="Consolas" panose="020B0609020204030204" pitchFamily="49" charset="0"/>
+              </a:rPr>
+              <a:t>    </a:t>
+            </a:r>
+            <a:r>
+              <a:rPr lang="en-US" dirty="0">
+                <a:solidFill>
+                  <a:srgbClr val="800000"/>
+                </a:solidFill>
+                <a:latin typeface="Consolas" panose="020B0609020204030204" pitchFamily="49" charset="0"/>
+              </a:rPr>
+              <a:t>&lt;/head&gt;</a:t>
+            </a:r>
+            <a:endParaRPr lang="en-US" dirty="0">
+              <a:latin typeface="Consolas" panose="020B0609020204030204" pitchFamily="49" charset="0"/>
+            </a:endParaRPr>
+          </a:p>
+          <a:p>
+            <a:r>
+              <a:rPr lang="en-US" dirty="0">
+                <a:latin typeface="Consolas" panose="020B0609020204030204" pitchFamily="49" charset="0"/>
+              </a:rPr>
+              <a:t>    </a:t>
+            </a:r>
+            <a:r>
+              <a:rPr lang="en-US" dirty="0">
+                <a:solidFill>
+                  <a:srgbClr val="800000"/>
+                </a:solidFill>
+                <a:latin typeface="Consolas" panose="020B0609020204030204" pitchFamily="49" charset="0"/>
+              </a:rPr>
+              <a:t>&lt;body</a:t>
+            </a:r>
+            <a:r>
+              <a:rPr lang="en-US" dirty="0">
+                <a:latin typeface="Consolas" panose="020B0609020204030204" pitchFamily="49" charset="0"/>
+              </a:rPr>
+              <a:t> </a:t>
+            </a:r>
+            <a:r>
+              <a:rPr lang="en-US" dirty="0">
+                <a:solidFill>
+                  <a:srgbClr val="FF0000"/>
+                </a:solidFill>
+                <a:latin typeface="Consolas" panose="020B0609020204030204" pitchFamily="49" charset="0"/>
+              </a:rPr>
+              <a:t>class</a:t>
+            </a:r>
+            <a:r>
+              <a:rPr lang="en-US" dirty="0">
+                <a:latin typeface="Consolas" panose="020B0609020204030204" pitchFamily="49" charset="0"/>
+              </a:rPr>
+              <a:t>=</a:t>
+            </a:r>
+            <a:r>
+              <a:rPr lang="en-US" dirty="0">
+                <a:solidFill>
+                  <a:srgbClr val="0000FF"/>
+                </a:solidFill>
+                <a:latin typeface="Consolas" panose="020B0609020204030204" pitchFamily="49" charset="0"/>
+              </a:rPr>
+              <a:t>"</a:t>
+            </a:r>
+            <a:r>
+              <a:rPr lang="en-US" dirty="0" err="1">
+                <a:solidFill>
+                  <a:srgbClr val="0000FF"/>
+                </a:solidFill>
+                <a:latin typeface="Consolas" panose="020B0609020204030204" pitchFamily="49" charset="0"/>
+              </a:rPr>
+              <a:t>sapUiBody</a:t>
+            </a:r>
+            <a:r>
+              <a:rPr lang="en-US" dirty="0">
+                <a:solidFill>
+                  <a:srgbClr val="0000FF"/>
+                </a:solidFill>
+                <a:latin typeface="Consolas" panose="020B0609020204030204" pitchFamily="49" charset="0"/>
+              </a:rPr>
+              <a:t>"</a:t>
+            </a:r>
+            <a:r>
+              <a:rPr lang="en-US" dirty="0">
+                <a:latin typeface="Consolas" panose="020B0609020204030204" pitchFamily="49" charset="0"/>
+              </a:rPr>
+              <a:t> </a:t>
+            </a:r>
+            <a:r>
+              <a:rPr lang="en-US" dirty="0">
+                <a:solidFill>
+                  <a:srgbClr val="FF0000"/>
+                </a:solidFill>
+                <a:latin typeface="Consolas" panose="020B0609020204030204" pitchFamily="49" charset="0"/>
+              </a:rPr>
+              <a:t>id</a:t>
+            </a:r>
+            <a:r>
+              <a:rPr lang="en-US" dirty="0">
+                <a:latin typeface="Consolas" panose="020B0609020204030204" pitchFamily="49" charset="0"/>
+              </a:rPr>
+              <a:t>=</a:t>
+            </a:r>
+            <a:r>
+              <a:rPr lang="en-US" dirty="0">
+                <a:solidFill>
+                  <a:srgbClr val="0000FF"/>
+                </a:solidFill>
+                <a:latin typeface="Consolas" panose="020B0609020204030204" pitchFamily="49" charset="0"/>
+              </a:rPr>
+              <a:t>"content"</a:t>
+            </a:r>
+            <a:r>
+              <a:rPr lang="en-US" dirty="0">
+                <a:solidFill>
+                  <a:srgbClr val="800000"/>
+                </a:solidFill>
+                <a:latin typeface="Consolas" panose="020B0609020204030204" pitchFamily="49" charset="0"/>
+              </a:rPr>
+              <a:t>&gt;&lt;/body&gt;</a:t>
+            </a:r>
+            <a:endParaRPr lang="en-US" dirty="0">
+              <a:latin typeface="Consolas" panose="020B0609020204030204" pitchFamily="49" charset="0"/>
+            </a:endParaRPr>
+          </a:p>
+          <a:p>
+            <a:r>
+              <a:rPr lang="en-US" dirty="0">
+                <a:solidFill>
+                  <a:srgbClr val="800000"/>
+                </a:solidFill>
+                <a:latin typeface="Consolas" panose="020B0609020204030204" pitchFamily="49" charset="0"/>
+              </a:rPr>
+              <a:t>&lt;/html&gt;</a:t>
+            </a:r>
+            <a:endParaRPr lang="en-US" dirty="0">
+              <a:latin typeface="Consolas" panose="020B0609020204030204" pitchFamily="49" charset="0"/>
+            </a:endParaRPr>
+          </a:p>
+        </p:txBody>
+      </p:sp>
+    </p:spTree>
+    <p:extLst>
+      <p:ext uri="{BB962C8B-B14F-4D97-AF65-F5344CB8AC3E}">
+        <p14:creationId xmlns:p14="http://schemas.microsoft.com/office/powerpoint/2010/main" val="1213109181"/>
+      </p:ext>
+    </p:extLst>
+  </p:cSld>
+  <p:clrMapOvr>
+    <a:masterClrMapping/>
+  </p:clrMapOvr>
+</p:sld>
+</file>
+
+<file path=ppt/slides/slide13.xml><?xml version="1.0" encoding="utf-8"?>
+<p:sld xmlns:a="http://schemas.openxmlformats.org/drawingml/2006/main" xmlns:r="http://schemas.openxmlformats.org/officeDocument/2006/relationships" xmlns:p="http://schemas.openxmlformats.org/presentationml/2006/main">
+  <p:cSld>
+    <p:spTree>
+      <p:nvGrpSpPr>
+        <p:cNvPr id="1" name=""/>
+        <p:cNvGrpSpPr/>
+        <p:nvPr/>
+      </p:nvGrpSpPr>
+      <p:grpSpPr>
+        <a:xfrm>
+          <a:off x="0" y="0"/>
+          <a:ext cx="0" cy="0"/>
+          <a:chOff x="0" y="0"/>
+          <a:chExt cx="0" cy="0"/>
+        </a:xfrm>
+      </p:grpSpPr>
+      <p:sp>
+        <p:nvSpPr>
+          <p:cNvPr id="2" name="Title 1">
+            <a:extLst>
+              <a:ext uri="{FF2B5EF4-FFF2-40B4-BE49-F238E27FC236}">
+                <a16:creationId xmlns:a16="http://schemas.microsoft.com/office/drawing/2014/main" id="{8B45E4C9-DB1E-4CA5-8EB5-78E59F7F1576}"/>
+              </a:ext>
+            </a:extLst>
+          </p:cNvPr>
+          <p:cNvSpPr>
+            <a:spLocks noGrp="1"/>
+          </p:cNvSpPr>
+          <p:nvPr>
+            <p:ph type="title"/>
+          </p:nvPr>
+        </p:nvSpPr>
+        <p:spPr/>
+        <p:txBody>
+          <a:bodyPr/>
+          <a:lstStyle/>
+          <a:p>
+            <a:r>
+              <a:rPr lang="en-US" dirty="0"/>
+              <a:t>App#3: Bootstrapping from local</a:t>
+            </a:r>
+          </a:p>
+        </p:txBody>
+      </p:sp>
+      <p:sp>
+        <p:nvSpPr>
+          <p:cNvPr id="4" name="Rectangle 3">
+            <a:extLst>
+              <a:ext uri="{FF2B5EF4-FFF2-40B4-BE49-F238E27FC236}">
+                <a16:creationId xmlns:a16="http://schemas.microsoft.com/office/drawing/2014/main" id="{1EC7D430-FC1F-43B6-A604-C6E69C833295}"/>
+              </a:ext>
+            </a:extLst>
+          </p:cNvPr>
+          <p:cNvSpPr/>
+          <p:nvPr/>
+        </p:nvSpPr>
+        <p:spPr>
+          <a:xfrm>
+            <a:off x="138546" y="1214012"/>
+            <a:ext cx="9864223" cy="5693866"/>
+          </a:xfrm>
+          <a:prstGeom prst="rect">
+            <a:avLst/>
+          </a:prstGeom>
+        </p:spPr>
+        <p:txBody>
+          <a:bodyPr wrap="square">
+            <a:spAutoFit/>
+          </a:bodyPr>
+          <a:lstStyle/>
+          <a:p>
+            <a:r>
+              <a:rPr lang="en-US" dirty="0">
+                <a:solidFill>
+                  <a:srgbClr val="800000"/>
+                </a:solidFill>
+                <a:latin typeface="Consolas" panose="020B0609020204030204" pitchFamily="49" charset="0"/>
+              </a:rPr>
+              <a:t>&lt;!DOCTYPE</a:t>
+            </a:r>
+            <a:r>
+              <a:rPr lang="en-US" dirty="0">
+                <a:latin typeface="Consolas" panose="020B0609020204030204" pitchFamily="49" charset="0"/>
+              </a:rPr>
+              <a:t> </a:t>
+            </a:r>
+            <a:r>
+              <a:rPr lang="en-US" dirty="0">
+                <a:solidFill>
+                  <a:srgbClr val="FF0000"/>
+                </a:solidFill>
+                <a:latin typeface="Consolas" panose="020B0609020204030204" pitchFamily="49" charset="0"/>
+              </a:rPr>
+              <a:t>html</a:t>
+            </a:r>
+            <a:r>
+              <a:rPr lang="en-US" dirty="0">
+                <a:solidFill>
+                  <a:srgbClr val="800000"/>
+                </a:solidFill>
+                <a:latin typeface="Consolas" panose="020B0609020204030204" pitchFamily="49" charset="0"/>
+              </a:rPr>
+              <a:t>&gt;</a:t>
+            </a:r>
+            <a:endParaRPr lang="en-US" dirty="0">
+              <a:latin typeface="Consolas" panose="020B0609020204030204" pitchFamily="49" charset="0"/>
+            </a:endParaRPr>
+          </a:p>
+          <a:p>
+            <a:r>
+              <a:rPr lang="en-US" dirty="0">
+                <a:solidFill>
+                  <a:srgbClr val="800000"/>
+                </a:solidFill>
+                <a:latin typeface="Consolas" panose="020B0609020204030204" pitchFamily="49" charset="0"/>
+              </a:rPr>
+              <a:t>&lt;html&gt;</a:t>
+            </a:r>
+            <a:endParaRPr lang="en-US" dirty="0">
+              <a:latin typeface="Consolas" panose="020B0609020204030204" pitchFamily="49" charset="0"/>
+            </a:endParaRPr>
+          </a:p>
+          <a:p>
+            <a:r>
+              <a:rPr lang="en-US" dirty="0">
+                <a:latin typeface="Consolas" panose="020B0609020204030204" pitchFamily="49" charset="0"/>
+              </a:rPr>
+              <a:t>    </a:t>
+            </a:r>
+            <a:r>
+              <a:rPr lang="en-US" dirty="0">
+                <a:solidFill>
+                  <a:srgbClr val="800000"/>
+                </a:solidFill>
+                <a:latin typeface="Consolas" panose="020B0609020204030204" pitchFamily="49" charset="0"/>
+              </a:rPr>
+              <a:t>&lt;head&gt;</a:t>
+            </a:r>
+            <a:endParaRPr lang="en-US" dirty="0">
+              <a:latin typeface="Consolas" panose="020B0609020204030204" pitchFamily="49" charset="0"/>
+            </a:endParaRPr>
+          </a:p>
+          <a:p>
+            <a:r>
+              <a:rPr lang="en-US" dirty="0">
+                <a:latin typeface="Consolas" panose="020B0609020204030204" pitchFamily="49" charset="0"/>
+              </a:rPr>
+              <a:t>        </a:t>
+            </a:r>
+            <a:r>
+              <a:rPr lang="en-US" dirty="0">
+                <a:solidFill>
+                  <a:srgbClr val="800000"/>
+                </a:solidFill>
+                <a:latin typeface="Consolas" panose="020B0609020204030204" pitchFamily="49" charset="0"/>
+              </a:rPr>
+              <a:t>&lt;meta</a:t>
+            </a:r>
+            <a:r>
+              <a:rPr lang="en-US" dirty="0">
+                <a:latin typeface="Consolas" panose="020B0609020204030204" pitchFamily="49" charset="0"/>
+              </a:rPr>
+              <a:t> </a:t>
+            </a:r>
+            <a:r>
+              <a:rPr lang="en-US" dirty="0">
+                <a:solidFill>
+                  <a:srgbClr val="FF0000"/>
+                </a:solidFill>
+                <a:latin typeface="Consolas" panose="020B0609020204030204" pitchFamily="49" charset="0"/>
+              </a:rPr>
+              <a:t>charset</a:t>
+            </a:r>
+            <a:r>
+              <a:rPr lang="en-US" dirty="0">
+                <a:latin typeface="Consolas" panose="020B0609020204030204" pitchFamily="49" charset="0"/>
+              </a:rPr>
+              <a:t>=</a:t>
+            </a:r>
+            <a:r>
+              <a:rPr lang="en-US" dirty="0">
+                <a:solidFill>
+                  <a:srgbClr val="0000FF"/>
+                </a:solidFill>
+                <a:latin typeface="Consolas" panose="020B0609020204030204" pitchFamily="49" charset="0"/>
+              </a:rPr>
+              <a:t>"utf-8"</a:t>
+            </a:r>
+            <a:r>
+              <a:rPr lang="en-US" dirty="0">
+                <a:solidFill>
+                  <a:srgbClr val="800000"/>
+                </a:solidFill>
+                <a:latin typeface="Consolas" panose="020B0609020204030204" pitchFamily="49" charset="0"/>
+              </a:rPr>
+              <a:t>&gt;</a:t>
+            </a:r>
+            <a:endParaRPr lang="en-US" dirty="0">
+              <a:latin typeface="Consolas" panose="020B0609020204030204" pitchFamily="49" charset="0"/>
+            </a:endParaRPr>
+          </a:p>
+          <a:p>
+            <a:r>
+              <a:rPr lang="en-US" dirty="0">
+                <a:latin typeface="Consolas" panose="020B0609020204030204" pitchFamily="49" charset="0"/>
+              </a:rPr>
+              <a:t>        </a:t>
+            </a:r>
+            <a:r>
+              <a:rPr lang="en-US" dirty="0">
+                <a:solidFill>
+                  <a:srgbClr val="800000"/>
+                </a:solidFill>
+                <a:latin typeface="Consolas" panose="020B0609020204030204" pitchFamily="49" charset="0"/>
+              </a:rPr>
+              <a:t>&lt;title&gt;</a:t>
+            </a:r>
+            <a:r>
+              <a:rPr lang="en-US" dirty="0">
+                <a:latin typeface="Consolas" panose="020B0609020204030204" pitchFamily="49" charset="0"/>
+              </a:rPr>
+              <a:t>I Love UI5</a:t>
+            </a:r>
+            <a:r>
+              <a:rPr lang="en-US" dirty="0">
+                <a:solidFill>
+                  <a:srgbClr val="800000"/>
+                </a:solidFill>
+                <a:latin typeface="Consolas" panose="020B0609020204030204" pitchFamily="49" charset="0"/>
+              </a:rPr>
+              <a:t>&lt;/title&gt;</a:t>
+            </a:r>
+            <a:endParaRPr lang="en-US" dirty="0">
+              <a:latin typeface="Consolas" panose="020B0609020204030204" pitchFamily="49" charset="0"/>
+            </a:endParaRPr>
+          </a:p>
+          <a:p>
+            <a:r>
+              <a:rPr lang="en-US" dirty="0">
+                <a:latin typeface="Consolas" panose="020B0609020204030204" pitchFamily="49" charset="0"/>
+              </a:rPr>
+              <a:t>        </a:t>
+            </a:r>
+            <a:r>
+              <a:rPr lang="en-US" dirty="0">
+                <a:solidFill>
+                  <a:srgbClr val="800000"/>
+                </a:solidFill>
+                <a:latin typeface="Consolas" panose="020B0609020204030204" pitchFamily="49" charset="0"/>
+              </a:rPr>
+              <a:t>&lt;script</a:t>
+            </a:r>
+            <a:r>
+              <a:rPr lang="en-US" dirty="0">
+                <a:latin typeface="Consolas" panose="020B0609020204030204" pitchFamily="49" charset="0"/>
+              </a:rPr>
+              <a:t> </a:t>
+            </a:r>
+            <a:r>
+              <a:rPr lang="en-US" dirty="0">
+                <a:solidFill>
+                  <a:srgbClr val="FF0000"/>
+                </a:solidFill>
+                <a:latin typeface="Consolas" panose="020B0609020204030204" pitchFamily="49" charset="0"/>
+              </a:rPr>
+              <a:t>id</a:t>
+            </a:r>
+            <a:r>
+              <a:rPr lang="en-US" dirty="0">
+                <a:latin typeface="Consolas" panose="020B0609020204030204" pitchFamily="49" charset="0"/>
+              </a:rPr>
+              <a:t>=</a:t>
+            </a:r>
+            <a:r>
+              <a:rPr lang="en-US" dirty="0">
+                <a:solidFill>
+                  <a:srgbClr val="0000FF"/>
+                </a:solidFill>
+                <a:latin typeface="Consolas" panose="020B0609020204030204" pitchFamily="49" charset="0"/>
+              </a:rPr>
+              <a:t>"sap-</a:t>
+            </a:r>
+            <a:r>
+              <a:rPr lang="en-US" dirty="0" err="1">
+                <a:solidFill>
+                  <a:srgbClr val="0000FF"/>
+                </a:solidFill>
+                <a:latin typeface="Consolas" panose="020B0609020204030204" pitchFamily="49" charset="0"/>
+              </a:rPr>
+              <a:t>ui</a:t>
+            </a:r>
+            <a:r>
+              <a:rPr lang="en-US" dirty="0">
+                <a:solidFill>
+                  <a:srgbClr val="0000FF"/>
+                </a:solidFill>
+                <a:latin typeface="Consolas" panose="020B0609020204030204" pitchFamily="49" charset="0"/>
+              </a:rPr>
+              <a:t>-bootstrap"</a:t>
+            </a:r>
+            <a:endParaRPr lang="en-US" dirty="0">
+              <a:latin typeface="Consolas" panose="020B0609020204030204" pitchFamily="49" charset="0"/>
+            </a:endParaRPr>
+          </a:p>
+          <a:p>
+            <a:r>
+              <a:rPr lang="en-US" dirty="0">
+                <a:latin typeface="Consolas" panose="020B0609020204030204" pitchFamily="49" charset="0"/>
+              </a:rPr>
+              <a:t>            </a:t>
+            </a:r>
+            <a:r>
+              <a:rPr lang="en-US" dirty="0" err="1">
+                <a:solidFill>
+                  <a:srgbClr val="FF0000"/>
+                </a:solidFill>
+                <a:latin typeface="Consolas" panose="020B0609020204030204" pitchFamily="49" charset="0"/>
+              </a:rPr>
+              <a:t>src</a:t>
+            </a:r>
+            <a:r>
+              <a:rPr lang="en-US" dirty="0">
+                <a:latin typeface="Consolas" panose="020B0609020204030204" pitchFamily="49" charset="0"/>
+              </a:rPr>
+              <a:t>=</a:t>
+            </a:r>
+            <a:r>
+              <a:rPr lang="en-US" dirty="0">
+                <a:solidFill>
+                  <a:srgbClr val="0000FF"/>
+                </a:solidFill>
+                <a:latin typeface="Consolas" panose="020B0609020204030204" pitchFamily="49" charset="0"/>
+              </a:rPr>
+              <a:t>"../openui5/openui5-runtime-1.70.0/resources/sap-ui-core.js"</a:t>
+            </a:r>
+            <a:endParaRPr lang="en-US" dirty="0">
+              <a:latin typeface="Consolas" panose="020B0609020204030204" pitchFamily="49" charset="0"/>
+            </a:endParaRPr>
+          </a:p>
+          <a:p>
+            <a:r>
+              <a:rPr lang="en-US" dirty="0">
+                <a:latin typeface="Consolas" panose="020B0609020204030204" pitchFamily="49" charset="0"/>
+              </a:rPr>
+              <a:t>            </a:t>
+            </a:r>
+            <a:r>
+              <a:rPr lang="en-US" dirty="0">
+                <a:solidFill>
+                  <a:srgbClr val="FF0000"/>
+                </a:solidFill>
+                <a:latin typeface="Consolas" panose="020B0609020204030204" pitchFamily="49" charset="0"/>
+              </a:rPr>
+              <a:t>data-sap-</a:t>
+            </a:r>
+            <a:r>
+              <a:rPr lang="en-US" dirty="0" err="1">
+                <a:solidFill>
+                  <a:srgbClr val="FF0000"/>
+                </a:solidFill>
+                <a:latin typeface="Consolas" panose="020B0609020204030204" pitchFamily="49" charset="0"/>
+              </a:rPr>
+              <a:t>ui</a:t>
+            </a:r>
+            <a:r>
+              <a:rPr lang="en-US" dirty="0">
+                <a:solidFill>
+                  <a:srgbClr val="FF0000"/>
+                </a:solidFill>
+                <a:latin typeface="Consolas" panose="020B0609020204030204" pitchFamily="49" charset="0"/>
+              </a:rPr>
+              <a:t>-theme</a:t>
+            </a:r>
+            <a:r>
+              <a:rPr lang="en-US" dirty="0">
+                <a:latin typeface="Consolas" panose="020B0609020204030204" pitchFamily="49" charset="0"/>
+              </a:rPr>
+              <a:t>=</a:t>
+            </a:r>
+            <a:r>
+              <a:rPr lang="en-US" dirty="0">
+                <a:solidFill>
+                  <a:srgbClr val="0000FF"/>
+                </a:solidFill>
+                <a:latin typeface="Consolas" panose="020B0609020204030204" pitchFamily="49" charset="0"/>
+              </a:rPr>
+              <a:t>"</a:t>
+            </a:r>
+            <a:r>
+              <a:rPr lang="en-US" dirty="0" err="1">
+                <a:solidFill>
+                  <a:srgbClr val="0000FF"/>
+                </a:solidFill>
+                <a:latin typeface="Consolas" panose="020B0609020204030204" pitchFamily="49" charset="0"/>
+              </a:rPr>
+              <a:t>sap_belize</a:t>
+            </a:r>
+            <a:r>
+              <a:rPr lang="en-US" dirty="0">
+                <a:solidFill>
+                  <a:srgbClr val="0000FF"/>
+                </a:solidFill>
+                <a:latin typeface="Consolas" panose="020B0609020204030204" pitchFamily="49" charset="0"/>
+              </a:rPr>
+              <a:t>"</a:t>
+            </a:r>
+            <a:endParaRPr lang="en-US" dirty="0">
+              <a:latin typeface="Consolas" panose="020B0609020204030204" pitchFamily="49" charset="0"/>
+            </a:endParaRPr>
+          </a:p>
+          <a:p>
+            <a:r>
+              <a:rPr lang="en-US" dirty="0">
+                <a:latin typeface="Consolas" panose="020B0609020204030204" pitchFamily="49" charset="0"/>
+              </a:rPr>
+              <a:t>            </a:t>
+            </a:r>
+            <a:r>
+              <a:rPr lang="en-US" dirty="0">
+                <a:solidFill>
+                  <a:srgbClr val="FF0000"/>
+                </a:solidFill>
+                <a:latin typeface="Consolas" panose="020B0609020204030204" pitchFamily="49" charset="0"/>
+              </a:rPr>
+              <a:t>data-sap-</a:t>
+            </a:r>
+            <a:r>
+              <a:rPr lang="en-US" dirty="0" err="1">
+                <a:solidFill>
+                  <a:srgbClr val="FF0000"/>
+                </a:solidFill>
+                <a:latin typeface="Consolas" panose="020B0609020204030204" pitchFamily="49" charset="0"/>
+              </a:rPr>
+              <a:t>ui</a:t>
+            </a:r>
+            <a:r>
+              <a:rPr lang="en-US" dirty="0">
+                <a:solidFill>
+                  <a:srgbClr val="FF0000"/>
+                </a:solidFill>
+                <a:latin typeface="Consolas" panose="020B0609020204030204" pitchFamily="49" charset="0"/>
+              </a:rPr>
+              <a:t>-libs</a:t>
+            </a:r>
+            <a:r>
+              <a:rPr lang="en-US" dirty="0">
+                <a:latin typeface="Consolas" panose="020B0609020204030204" pitchFamily="49" charset="0"/>
+              </a:rPr>
+              <a:t>=</a:t>
+            </a:r>
+            <a:r>
+              <a:rPr lang="en-US" dirty="0">
+                <a:solidFill>
+                  <a:srgbClr val="0000FF"/>
+                </a:solidFill>
+                <a:latin typeface="Consolas" panose="020B0609020204030204" pitchFamily="49" charset="0"/>
+              </a:rPr>
+              <a:t>"</a:t>
+            </a:r>
+            <a:r>
+              <a:rPr lang="en-US" dirty="0" err="1">
+                <a:solidFill>
+                  <a:srgbClr val="0000FF"/>
+                </a:solidFill>
+                <a:latin typeface="Consolas" panose="020B0609020204030204" pitchFamily="49" charset="0"/>
+              </a:rPr>
+              <a:t>sap.m</a:t>
+            </a:r>
+            <a:r>
+              <a:rPr lang="en-US" dirty="0">
+                <a:solidFill>
+                  <a:srgbClr val="0000FF"/>
+                </a:solidFill>
+                <a:latin typeface="Consolas" panose="020B0609020204030204" pitchFamily="49" charset="0"/>
+              </a:rPr>
+              <a:t>"</a:t>
+            </a:r>
+            <a:endParaRPr lang="en-US" dirty="0">
+              <a:latin typeface="Consolas" panose="020B0609020204030204" pitchFamily="49" charset="0"/>
+            </a:endParaRPr>
+          </a:p>
+          <a:p>
+            <a:r>
+              <a:rPr lang="en-US" dirty="0">
+                <a:latin typeface="Consolas" panose="020B0609020204030204" pitchFamily="49" charset="0"/>
+              </a:rPr>
+              <a:t>            </a:t>
+            </a:r>
+            <a:r>
+              <a:rPr lang="en-US" dirty="0">
+                <a:solidFill>
+                  <a:srgbClr val="FF0000"/>
+                </a:solidFill>
+                <a:latin typeface="Consolas" panose="020B0609020204030204" pitchFamily="49" charset="0"/>
+              </a:rPr>
+              <a:t>data-sap-</a:t>
+            </a:r>
+            <a:r>
+              <a:rPr lang="en-US" dirty="0" err="1">
+                <a:solidFill>
+                  <a:srgbClr val="FF0000"/>
+                </a:solidFill>
+                <a:latin typeface="Consolas" panose="020B0609020204030204" pitchFamily="49" charset="0"/>
+              </a:rPr>
+              <a:t>ui</a:t>
+            </a:r>
+            <a:r>
+              <a:rPr lang="en-US" dirty="0">
+                <a:solidFill>
+                  <a:srgbClr val="FF0000"/>
+                </a:solidFill>
+                <a:latin typeface="Consolas" panose="020B0609020204030204" pitchFamily="49" charset="0"/>
+              </a:rPr>
+              <a:t>-</a:t>
+            </a:r>
+            <a:r>
+              <a:rPr lang="en-US" dirty="0" err="1">
+                <a:solidFill>
+                  <a:srgbClr val="FF0000"/>
+                </a:solidFill>
+                <a:latin typeface="Consolas" panose="020B0609020204030204" pitchFamily="49" charset="0"/>
+              </a:rPr>
+              <a:t>resourceroots</a:t>
+            </a:r>
+            <a:r>
+              <a:rPr lang="en-US" dirty="0">
+                <a:latin typeface="Consolas" panose="020B0609020204030204" pitchFamily="49" charset="0"/>
+              </a:rPr>
+              <a:t>=</a:t>
+            </a:r>
+            <a:r>
+              <a:rPr lang="en-US" dirty="0">
+                <a:solidFill>
+                  <a:srgbClr val="0000FF"/>
+                </a:solidFill>
+                <a:latin typeface="Consolas" panose="020B0609020204030204" pitchFamily="49" charset="0"/>
+              </a:rPr>
+              <a:t>'{"</a:t>
+            </a:r>
+            <a:r>
+              <a:rPr lang="en-US" dirty="0" err="1">
+                <a:solidFill>
+                  <a:srgbClr val="0000FF"/>
+                </a:solidFill>
+                <a:latin typeface="Consolas" panose="020B0609020204030204" pitchFamily="49" charset="0"/>
+              </a:rPr>
+              <a:t>com.mjzsoft</a:t>
+            </a:r>
+            <a:r>
+              <a:rPr lang="en-US" dirty="0">
+                <a:solidFill>
+                  <a:srgbClr val="0000FF"/>
+                </a:solidFill>
+                <a:latin typeface="Consolas" panose="020B0609020204030204" pitchFamily="49" charset="0"/>
+              </a:rPr>
+              <a:t>": "./"}'</a:t>
+            </a:r>
+            <a:endParaRPr lang="en-US" dirty="0">
+              <a:latin typeface="Consolas" panose="020B0609020204030204" pitchFamily="49" charset="0"/>
+            </a:endParaRPr>
+          </a:p>
+          <a:p>
+            <a:r>
+              <a:rPr lang="en-US" dirty="0">
+                <a:latin typeface="Consolas" panose="020B0609020204030204" pitchFamily="49" charset="0"/>
+              </a:rPr>
+              <a:t>            </a:t>
+            </a:r>
+            <a:r>
+              <a:rPr lang="en-US" dirty="0">
+                <a:solidFill>
+                  <a:srgbClr val="FF0000"/>
+                </a:solidFill>
+                <a:latin typeface="Consolas" panose="020B0609020204030204" pitchFamily="49" charset="0"/>
+              </a:rPr>
+              <a:t>data-sap-</a:t>
+            </a:r>
+            <a:r>
+              <a:rPr lang="en-US" dirty="0" err="1">
+                <a:solidFill>
+                  <a:srgbClr val="FF0000"/>
+                </a:solidFill>
+                <a:latin typeface="Consolas" panose="020B0609020204030204" pitchFamily="49" charset="0"/>
+              </a:rPr>
+              <a:t>ui</a:t>
+            </a:r>
+            <a:r>
+              <a:rPr lang="en-US" dirty="0">
+                <a:solidFill>
+                  <a:srgbClr val="FF0000"/>
+                </a:solidFill>
+                <a:latin typeface="Consolas" panose="020B0609020204030204" pitchFamily="49" charset="0"/>
+              </a:rPr>
+              <a:t>-async</a:t>
+            </a:r>
+            <a:r>
+              <a:rPr lang="en-US" dirty="0">
+                <a:latin typeface="Consolas" panose="020B0609020204030204" pitchFamily="49" charset="0"/>
+              </a:rPr>
+              <a:t>=</a:t>
+            </a:r>
+            <a:r>
+              <a:rPr lang="en-US" dirty="0">
+                <a:solidFill>
+                  <a:srgbClr val="0000FF"/>
+                </a:solidFill>
+                <a:latin typeface="Consolas" panose="020B0609020204030204" pitchFamily="49" charset="0"/>
+              </a:rPr>
+              <a:t>"true"</a:t>
+            </a:r>
+            <a:r>
+              <a:rPr lang="en-US" dirty="0">
+                <a:solidFill>
+                  <a:srgbClr val="800000"/>
+                </a:solidFill>
+                <a:latin typeface="Consolas" panose="020B0609020204030204" pitchFamily="49" charset="0"/>
+              </a:rPr>
+              <a:t>&gt;</a:t>
+            </a:r>
+            <a:endParaRPr lang="en-US" dirty="0">
+              <a:latin typeface="Consolas" panose="020B0609020204030204" pitchFamily="49" charset="0"/>
+            </a:endParaRPr>
+          </a:p>
+          <a:p>
+            <a:r>
+              <a:rPr lang="en-US" dirty="0">
+                <a:latin typeface="Consolas" panose="020B0609020204030204" pitchFamily="49" charset="0"/>
+              </a:rPr>
+              <a:t>        </a:t>
+            </a:r>
+            <a:r>
+              <a:rPr lang="en-US" dirty="0">
+                <a:solidFill>
+                  <a:srgbClr val="800000"/>
+                </a:solidFill>
+                <a:latin typeface="Consolas" panose="020B0609020204030204" pitchFamily="49" charset="0"/>
+              </a:rPr>
+              <a:t>&lt;/script&gt;</a:t>
+            </a:r>
+            <a:endParaRPr lang="en-US" dirty="0">
+              <a:latin typeface="Consolas" panose="020B0609020204030204" pitchFamily="49" charset="0"/>
+            </a:endParaRPr>
+          </a:p>
+          <a:p>
+            <a:r>
+              <a:rPr lang="en-US" dirty="0">
+                <a:latin typeface="Consolas" panose="020B0609020204030204" pitchFamily="49" charset="0"/>
+              </a:rPr>
+              <a:t>                </a:t>
+            </a:r>
+            <a:r>
+              <a:rPr lang="en-US" dirty="0">
+                <a:solidFill>
+                  <a:srgbClr val="800000"/>
+                </a:solidFill>
+                <a:latin typeface="Consolas" panose="020B0609020204030204" pitchFamily="49" charset="0"/>
+              </a:rPr>
+              <a:t>&lt;script&gt;</a:t>
+            </a:r>
+            <a:endParaRPr lang="en-US" dirty="0">
+              <a:latin typeface="Consolas" panose="020B0609020204030204" pitchFamily="49" charset="0"/>
+            </a:endParaRPr>
+          </a:p>
+          <a:p>
+            <a:r>
+              <a:rPr lang="en-US" dirty="0">
+                <a:latin typeface="Consolas" panose="020B0609020204030204" pitchFamily="49" charset="0"/>
+              </a:rPr>
+              <a:t>            </a:t>
+            </a:r>
+            <a:r>
+              <a:rPr lang="en-US" dirty="0" err="1">
+                <a:latin typeface="Consolas" panose="020B0609020204030204" pitchFamily="49" charset="0"/>
+              </a:rPr>
+              <a:t>sap.ui.getCore</a:t>
+            </a:r>
+            <a:r>
+              <a:rPr lang="en-US" dirty="0">
+                <a:latin typeface="Consolas" panose="020B0609020204030204" pitchFamily="49" charset="0"/>
+              </a:rPr>
+              <a:t>().</a:t>
+            </a:r>
+            <a:r>
+              <a:rPr lang="en-US" dirty="0" err="1">
+                <a:latin typeface="Consolas" panose="020B0609020204030204" pitchFamily="49" charset="0"/>
+              </a:rPr>
+              <a:t>attachInit</a:t>
+            </a:r>
+            <a:r>
+              <a:rPr lang="en-US" dirty="0">
+                <a:latin typeface="Consolas" panose="020B0609020204030204" pitchFamily="49" charset="0"/>
+              </a:rPr>
+              <a:t>(</a:t>
+            </a:r>
+            <a:r>
+              <a:rPr lang="en-US" dirty="0">
+                <a:solidFill>
+                  <a:srgbClr val="0000FF"/>
+                </a:solidFill>
+                <a:latin typeface="Consolas" panose="020B0609020204030204" pitchFamily="49" charset="0"/>
+              </a:rPr>
+              <a:t>function</a:t>
+            </a:r>
+            <a:r>
+              <a:rPr lang="en-US" dirty="0">
+                <a:latin typeface="Consolas" panose="020B0609020204030204" pitchFamily="49" charset="0"/>
+              </a:rPr>
+              <a:t> () {</a:t>
+            </a:r>
+          </a:p>
+          <a:p>
+            <a:r>
+              <a:rPr lang="en-US" dirty="0">
+                <a:latin typeface="Consolas" panose="020B0609020204030204" pitchFamily="49" charset="0"/>
+              </a:rPr>
+              <a:t>                </a:t>
+            </a:r>
+            <a:r>
+              <a:rPr lang="en-US" dirty="0" err="1">
+                <a:latin typeface="Consolas" panose="020B0609020204030204" pitchFamily="49" charset="0"/>
+              </a:rPr>
+              <a:t>sap.ui.require</a:t>
+            </a:r>
+            <a:r>
+              <a:rPr lang="en-US" dirty="0">
+                <a:latin typeface="Consolas" panose="020B0609020204030204" pitchFamily="49" charset="0"/>
+              </a:rPr>
+              <a:t>([</a:t>
+            </a:r>
+          </a:p>
+          <a:p>
+            <a:r>
+              <a:rPr lang="en-US" dirty="0">
+                <a:latin typeface="Consolas" panose="020B0609020204030204" pitchFamily="49" charset="0"/>
+              </a:rPr>
+              <a:t>                    </a:t>
+            </a:r>
+            <a:r>
+              <a:rPr lang="en-US" dirty="0">
+                <a:solidFill>
+                  <a:srgbClr val="A31515"/>
+                </a:solidFill>
+                <a:latin typeface="Consolas" panose="020B0609020204030204" pitchFamily="49" charset="0"/>
+              </a:rPr>
+              <a:t>"sap/</a:t>
+            </a:r>
+            <a:r>
+              <a:rPr lang="en-US" dirty="0" err="1">
+                <a:solidFill>
+                  <a:srgbClr val="A31515"/>
+                </a:solidFill>
+                <a:latin typeface="Consolas" panose="020B0609020204030204" pitchFamily="49" charset="0"/>
+              </a:rPr>
+              <a:t>ui</a:t>
+            </a:r>
+            <a:r>
+              <a:rPr lang="en-US" dirty="0">
+                <a:solidFill>
+                  <a:srgbClr val="A31515"/>
+                </a:solidFill>
+                <a:latin typeface="Consolas" panose="020B0609020204030204" pitchFamily="49" charset="0"/>
+              </a:rPr>
+              <a:t>/core/</a:t>
+            </a:r>
+            <a:r>
+              <a:rPr lang="en-US" dirty="0" err="1">
+                <a:solidFill>
+                  <a:srgbClr val="A31515"/>
+                </a:solidFill>
+                <a:latin typeface="Consolas" panose="020B0609020204030204" pitchFamily="49" charset="0"/>
+              </a:rPr>
+              <a:t>mvc</a:t>
+            </a:r>
+            <a:r>
+              <a:rPr lang="en-US" dirty="0">
+                <a:solidFill>
+                  <a:srgbClr val="A31515"/>
+                </a:solidFill>
+                <a:latin typeface="Consolas" panose="020B0609020204030204" pitchFamily="49" charset="0"/>
+              </a:rPr>
+              <a:t>/</a:t>
+            </a:r>
+            <a:r>
+              <a:rPr lang="en-US" dirty="0" err="1">
+                <a:solidFill>
+                  <a:srgbClr val="A31515"/>
+                </a:solidFill>
+                <a:latin typeface="Consolas" panose="020B0609020204030204" pitchFamily="49" charset="0"/>
+              </a:rPr>
+              <a:t>XMLView</a:t>
+            </a:r>
+            <a:r>
+              <a:rPr lang="en-US" dirty="0">
+                <a:solidFill>
+                  <a:srgbClr val="A31515"/>
+                </a:solidFill>
+                <a:latin typeface="Consolas" panose="020B0609020204030204" pitchFamily="49" charset="0"/>
+              </a:rPr>
+              <a:t>"</a:t>
+            </a:r>
+            <a:endParaRPr lang="en-US" dirty="0">
+              <a:latin typeface="Consolas" panose="020B0609020204030204" pitchFamily="49" charset="0"/>
+            </a:endParaRPr>
+          </a:p>
+          <a:p>
+            <a:r>
+              <a:rPr lang="en-US" dirty="0">
+                <a:latin typeface="Consolas" panose="020B0609020204030204" pitchFamily="49" charset="0"/>
+              </a:rPr>
+              <a:t>                ], </a:t>
+            </a:r>
+            <a:r>
+              <a:rPr lang="en-US" dirty="0">
+                <a:solidFill>
+                  <a:srgbClr val="0000FF"/>
+                </a:solidFill>
+                <a:latin typeface="Consolas" panose="020B0609020204030204" pitchFamily="49" charset="0"/>
+              </a:rPr>
+              <a:t>function</a:t>
+            </a:r>
+            <a:r>
+              <a:rPr lang="en-US" dirty="0">
+                <a:latin typeface="Consolas" panose="020B0609020204030204" pitchFamily="49" charset="0"/>
+              </a:rPr>
+              <a:t> (</a:t>
+            </a:r>
+            <a:r>
+              <a:rPr lang="en-US" dirty="0" err="1">
+                <a:latin typeface="Consolas" panose="020B0609020204030204" pitchFamily="49" charset="0"/>
+              </a:rPr>
+              <a:t>XMLView</a:t>
+            </a:r>
+            <a:r>
+              <a:rPr lang="en-US" dirty="0">
+                <a:latin typeface="Consolas" panose="020B0609020204030204" pitchFamily="49" charset="0"/>
+              </a:rPr>
+              <a:t>) {</a:t>
+            </a:r>
+          </a:p>
+          <a:p>
+            <a:r>
+              <a:rPr lang="en-US" dirty="0">
+                <a:latin typeface="Consolas" panose="020B0609020204030204" pitchFamily="49" charset="0"/>
+              </a:rPr>
+              <a:t>                    </a:t>
+            </a:r>
+            <a:r>
+              <a:rPr lang="en-US" dirty="0" err="1">
+                <a:latin typeface="Consolas" panose="020B0609020204030204" pitchFamily="49" charset="0"/>
+              </a:rPr>
+              <a:t>XMLView.create</a:t>
+            </a:r>
+            <a:r>
+              <a:rPr lang="en-US" dirty="0">
+                <a:latin typeface="Consolas" panose="020B0609020204030204" pitchFamily="49" charset="0"/>
+              </a:rPr>
+              <a:t>({</a:t>
+            </a:r>
+            <a:r>
+              <a:rPr lang="en-US" dirty="0" err="1">
+                <a:latin typeface="Consolas" panose="020B0609020204030204" pitchFamily="49" charset="0"/>
+              </a:rPr>
+              <a:t>viewName</a:t>
+            </a:r>
+            <a:r>
+              <a:rPr lang="en-US" dirty="0">
+                <a:latin typeface="Consolas" panose="020B0609020204030204" pitchFamily="49" charset="0"/>
+              </a:rPr>
+              <a:t>: </a:t>
+            </a:r>
+            <a:r>
+              <a:rPr lang="en-US" dirty="0">
+                <a:solidFill>
+                  <a:srgbClr val="A31515"/>
+                </a:solidFill>
+                <a:latin typeface="Consolas" panose="020B0609020204030204" pitchFamily="49" charset="0"/>
+              </a:rPr>
+              <a:t>"</a:t>
+            </a:r>
+            <a:r>
+              <a:rPr lang="en-US" dirty="0" err="1">
+                <a:solidFill>
+                  <a:srgbClr val="A31515"/>
+                </a:solidFill>
+                <a:latin typeface="Consolas" panose="020B0609020204030204" pitchFamily="49" charset="0"/>
+              </a:rPr>
+              <a:t>com.mjzsoft.App</a:t>
+            </a:r>
+            <a:r>
+              <a:rPr lang="en-US" dirty="0">
+                <a:solidFill>
+                  <a:srgbClr val="A31515"/>
+                </a:solidFill>
+                <a:latin typeface="Consolas" panose="020B0609020204030204" pitchFamily="49" charset="0"/>
+              </a:rPr>
+              <a:t>"</a:t>
+            </a:r>
+            <a:r>
+              <a:rPr lang="en-US" dirty="0">
+                <a:latin typeface="Consolas" panose="020B0609020204030204" pitchFamily="49" charset="0"/>
+              </a:rPr>
+              <a:t>}).then(</a:t>
+            </a:r>
+            <a:r>
+              <a:rPr lang="en-US" dirty="0">
+                <a:solidFill>
+                  <a:srgbClr val="0000FF"/>
+                </a:solidFill>
+                <a:latin typeface="Consolas" panose="020B0609020204030204" pitchFamily="49" charset="0"/>
+              </a:rPr>
+              <a:t>function</a:t>
+            </a:r>
+            <a:r>
+              <a:rPr lang="en-US" dirty="0">
+                <a:latin typeface="Consolas" panose="020B0609020204030204" pitchFamily="49" charset="0"/>
+              </a:rPr>
+              <a:t>(</a:t>
+            </a:r>
+            <a:r>
+              <a:rPr lang="en-US" dirty="0" err="1">
+                <a:latin typeface="Consolas" panose="020B0609020204030204" pitchFamily="49" charset="0"/>
+              </a:rPr>
+              <a:t>oView</a:t>
+            </a:r>
+            <a:r>
+              <a:rPr lang="en-US" dirty="0">
+                <a:latin typeface="Consolas" panose="020B0609020204030204" pitchFamily="49" charset="0"/>
+              </a:rPr>
+              <a:t>) {</a:t>
+            </a:r>
+          </a:p>
+          <a:p>
+            <a:r>
+              <a:rPr lang="en-US" dirty="0">
+                <a:latin typeface="Consolas" panose="020B0609020204030204" pitchFamily="49" charset="0"/>
+              </a:rPr>
+              <a:t>                        </a:t>
+            </a:r>
+            <a:r>
+              <a:rPr lang="en-US" dirty="0" err="1">
+                <a:latin typeface="Consolas" panose="020B0609020204030204" pitchFamily="49" charset="0"/>
+              </a:rPr>
+              <a:t>oView.placeAt</a:t>
+            </a:r>
+            <a:r>
+              <a:rPr lang="en-US" dirty="0">
+                <a:latin typeface="Consolas" panose="020B0609020204030204" pitchFamily="49" charset="0"/>
+              </a:rPr>
+              <a:t>(</a:t>
+            </a:r>
+            <a:r>
+              <a:rPr lang="en-US" dirty="0">
+                <a:solidFill>
+                  <a:srgbClr val="A31515"/>
+                </a:solidFill>
+                <a:latin typeface="Consolas" panose="020B0609020204030204" pitchFamily="49" charset="0"/>
+              </a:rPr>
+              <a:t>"content"</a:t>
+            </a:r>
+            <a:r>
+              <a:rPr lang="en-US" dirty="0">
+                <a:latin typeface="Consolas" panose="020B0609020204030204" pitchFamily="49" charset="0"/>
+              </a:rPr>
+              <a:t>);</a:t>
+            </a:r>
+          </a:p>
+          <a:p>
+            <a:r>
+              <a:rPr lang="en-US" dirty="0">
+                <a:latin typeface="Consolas" panose="020B0609020204030204" pitchFamily="49" charset="0"/>
+              </a:rPr>
+              <a:t>                    });</a:t>
+            </a:r>
+          </a:p>
+          <a:p>
+            <a:r>
+              <a:rPr lang="en-US" dirty="0">
+                <a:latin typeface="Consolas" panose="020B0609020204030204" pitchFamily="49" charset="0"/>
+              </a:rPr>
+              <a:t>                });</a:t>
+            </a:r>
+          </a:p>
+          <a:p>
+            <a:r>
+              <a:rPr lang="en-US" dirty="0">
+                <a:latin typeface="Consolas" panose="020B0609020204030204" pitchFamily="49" charset="0"/>
+              </a:rPr>
+              <a:t>            });</a:t>
+            </a:r>
+          </a:p>
+          <a:p>
+            <a:r>
+              <a:rPr lang="en-US" dirty="0">
+                <a:latin typeface="Consolas" panose="020B0609020204030204" pitchFamily="49" charset="0"/>
+              </a:rPr>
+              <a:t>        </a:t>
+            </a:r>
+            <a:r>
+              <a:rPr lang="en-US" dirty="0">
+                <a:solidFill>
+                  <a:srgbClr val="800000"/>
+                </a:solidFill>
+                <a:latin typeface="Consolas" panose="020B0609020204030204" pitchFamily="49" charset="0"/>
+              </a:rPr>
+              <a:t>&lt;/script&gt;</a:t>
+            </a:r>
+            <a:endParaRPr lang="en-US" dirty="0">
+              <a:latin typeface="Consolas" panose="020B0609020204030204" pitchFamily="49" charset="0"/>
+            </a:endParaRPr>
+          </a:p>
+          <a:p>
+            <a:r>
+              <a:rPr lang="en-US" dirty="0">
+                <a:latin typeface="Consolas" panose="020B0609020204030204" pitchFamily="49" charset="0"/>
+              </a:rPr>
+              <a:t>    </a:t>
+            </a:r>
+            <a:r>
+              <a:rPr lang="en-US" dirty="0">
+                <a:solidFill>
+                  <a:srgbClr val="800000"/>
+                </a:solidFill>
+                <a:latin typeface="Consolas" panose="020B0609020204030204" pitchFamily="49" charset="0"/>
+              </a:rPr>
+              <a:t>&lt;/head&gt;</a:t>
+            </a:r>
+            <a:endParaRPr lang="en-US" dirty="0">
+              <a:latin typeface="Consolas" panose="020B0609020204030204" pitchFamily="49" charset="0"/>
+            </a:endParaRPr>
+          </a:p>
+          <a:p>
+            <a:r>
+              <a:rPr lang="en-US" dirty="0">
+                <a:latin typeface="Consolas" panose="020B0609020204030204" pitchFamily="49" charset="0"/>
+              </a:rPr>
+              <a:t>    </a:t>
+            </a:r>
+            <a:r>
+              <a:rPr lang="en-US" dirty="0">
+                <a:solidFill>
+                  <a:srgbClr val="800000"/>
+                </a:solidFill>
+                <a:latin typeface="Consolas" panose="020B0609020204030204" pitchFamily="49" charset="0"/>
+              </a:rPr>
+              <a:t>&lt;body</a:t>
+            </a:r>
+            <a:r>
+              <a:rPr lang="en-US" dirty="0">
+                <a:latin typeface="Consolas" panose="020B0609020204030204" pitchFamily="49" charset="0"/>
+              </a:rPr>
+              <a:t> </a:t>
+            </a:r>
+            <a:r>
+              <a:rPr lang="en-US" dirty="0">
+                <a:solidFill>
+                  <a:srgbClr val="FF0000"/>
+                </a:solidFill>
+                <a:latin typeface="Consolas" panose="020B0609020204030204" pitchFamily="49" charset="0"/>
+              </a:rPr>
+              <a:t>class</a:t>
+            </a:r>
+            <a:r>
+              <a:rPr lang="en-US" dirty="0">
+                <a:latin typeface="Consolas" panose="020B0609020204030204" pitchFamily="49" charset="0"/>
+              </a:rPr>
+              <a:t>=</a:t>
+            </a:r>
+            <a:r>
+              <a:rPr lang="en-US" dirty="0">
+                <a:solidFill>
+                  <a:srgbClr val="0000FF"/>
+                </a:solidFill>
+                <a:latin typeface="Consolas" panose="020B0609020204030204" pitchFamily="49" charset="0"/>
+              </a:rPr>
+              <a:t>"</a:t>
+            </a:r>
+            <a:r>
+              <a:rPr lang="en-US" dirty="0" err="1">
+                <a:solidFill>
+                  <a:srgbClr val="0000FF"/>
+                </a:solidFill>
+                <a:latin typeface="Consolas" panose="020B0609020204030204" pitchFamily="49" charset="0"/>
+              </a:rPr>
+              <a:t>sapUiBody</a:t>
+            </a:r>
+            <a:r>
+              <a:rPr lang="en-US" dirty="0">
+                <a:solidFill>
+                  <a:srgbClr val="0000FF"/>
+                </a:solidFill>
+                <a:latin typeface="Consolas" panose="020B0609020204030204" pitchFamily="49" charset="0"/>
+              </a:rPr>
+              <a:t>"</a:t>
+            </a:r>
+            <a:r>
+              <a:rPr lang="en-US" dirty="0">
+                <a:latin typeface="Consolas" panose="020B0609020204030204" pitchFamily="49" charset="0"/>
+              </a:rPr>
+              <a:t> </a:t>
+            </a:r>
+            <a:r>
+              <a:rPr lang="en-US" dirty="0">
+                <a:solidFill>
+                  <a:srgbClr val="FF0000"/>
+                </a:solidFill>
+                <a:latin typeface="Consolas" panose="020B0609020204030204" pitchFamily="49" charset="0"/>
+              </a:rPr>
+              <a:t>id</a:t>
+            </a:r>
+            <a:r>
+              <a:rPr lang="en-US" dirty="0">
+                <a:latin typeface="Consolas" panose="020B0609020204030204" pitchFamily="49" charset="0"/>
+              </a:rPr>
+              <a:t>=</a:t>
+            </a:r>
+            <a:r>
+              <a:rPr lang="en-US" dirty="0">
+                <a:solidFill>
+                  <a:srgbClr val="0000FF"/>
+                </a:solidFill>
+                <a:latin typeface="Consolas" panose="020B0609020204030204" pitchFamily="49" charset="0"/>
+              </a:rPr>
+              <a:t>"content"</a:t>
+            </a:r>
+            <a:r>
+              <a:rPr lang="en-US" dirty="0">
+                <a:solidFill>
+                  <a:srgbClr val="800000"/>
+                </a:solidFill>
+                <a:latin typeface="Consolas" panose="020B0609020204030204" pitchFamily="49" charset="0"/>
+              </a:rPr>
+              <a:t>&gt;&lt;/body&gt;</a:t>
+            </a:r>
+            <a:endParaRPr lang="en-US" dirty="0">
+              <a:latin typeface="Consolas" panose="020B0609020204030204" pitchFamily="49" charset="0"/>
+            </a:endParaRPr>
+          </a:p>
+          <a:p>
+            <a:r>
+              <a:rPr lang="en-US" dirty="0">
+                <a:solidFill>
+                  <a:srgbClr val="800000"/>
+                </a:solidFill>
+                <a:latin typeface="Consolas" panose="020B0609020204030204" pitchFamily="49" charset="0"/>
+              </a:rPr>
+              <a:t>&lt;/html&gt;</a:t>
+            </a:r>
+            <a:endParaRPr lang="en-US" dirty="0">
+              <a:latin typeface="Consolas" panose="020B0609020204030204" pitchFamily="49" charset="0"/>
+            </a:endParaRPr>
+          </a:p>
+        </p:txBody>
+      </p:sp>
+    </p:spTree>
+    <p:extLst>
+      <p:ext uri="{BB962C8B-B14F-4D97-AF65-F5344CB8AC3E}">
+        <p14:creationId xmlns:p14="http://schemas.microsoft.com/office/powerpoint/2010/main" val="765784621"/>
       </p:ext>
     </p:extLst>
   </p:cSld>

</xml_diff>